<commit_message>
revise: shorter presentation transitions
</commit_message>
<xml_diff>
--- a/docs/FinalSeminarPresentation.pptx
+++ b/docs/FinalSeminarPresentation.pptx
@@ -8296,18 +8296,6 @@
   <p:clrMapOvr>
     <a:masterClrMapping/>
   </p:clrMapOvr>
-  <mc:AlternateContent xmlns:mc="http://schemas.openxmlformats.org/markup-compatibility/2006">
-    <mc:Choice xmlns:p14="http://schemas.microsoft.com/office/powerpoint/2010/main" Requires="p14">
-      <p:transition spd="slow" p14:dur="800">
-        <p14:glitter dir="r" pattern="hexagon"/>
-      </p:transition>
-    </mc:Choice>
-    <mc:Fallback>
-      <p:transition spd="slow">
-        <p:fade/>
-      </p:transition>
-    </mc:Fallback>
-  </mc:AlternateContent>
 </p:sldLayout>
 </file>
 
@@ -8483,18 +8471,6 @@
   <p:clrMapOvr>
     <a:masterClrMapping/>
   </p:clrMapOvr>
-  <mc:AlternateContent xmlns:mc="http://schemas.openxmlformats.org/markup-compatibility/2006">
-    <mc:Choice xmlns:p14="http://schemas.microsoft.com/office/powerpoint/2010/main" Requires="p14">
-      <p:transition spd="slow" p14:dur="800">
-        <p14:glitter dir="r" pattern="hexagon"/>
-      </p:transition>
-    </mc:Choice>
-    <mc:Fallback>
-      <p:transition spd="slow">
-        <p:fade/>
-      </p:transition>
-    </mc:Fallback>
-  </mc:AlternateContent>
 </p:sldLayout>
 </file>
 
@@ -8680,18 +8656,6 @@
   <p:clrMapOvr>
     <a:masterClrMapping/>
   </p:clrMapOvr>
-  <mc:AlternateContent xmlns:mc="http://schemas.openxmlformats.org/markup-compatibility/2006">
-    <mc:Choice xmlns:p14="http://schemas.microsoft.com/office/powerpoint/2010/main" Requires="p14">
-      <p:transition spd="slow" p14:dur="800">
-        <p14:glitter dir="r" pattern="hexagon"/>
-      </p:transition>
-    </mc:Choice>
-    <mc:Fallback>
-      <p:transition spd="slow">
-        <p:fade/>
-      </p:transition>
-    </mc:Fallback>
-  </mc:AlternateContent>
 </p:sldLayout>
 </file>
 
@@ -8823,18 +8787,6 @@
   <p:clrMapOvr>
     <a:masterClrMapping/>
   </p:clrMapOvr>
-  <mc:AlternateContent xmlns:mc="http://schemas.openxmlformats.org/markup-compatibility/2006">
-    <mc:Choice xmlns:p14="http://schemas.microsoft.com/office/powerpoint/2010/main" Requires="p14">
-      <p:transition spd="slow" p14:dur="800">
-        <p14:glitter dir="r" pattern="hexagon"/>
-      </p:transition>
-    </mc:Choice>
-    <mc:Fallback>
-      <p:transition spd="slow">
-        <p:fade/>
-      </p:transition>
-    </mc:Fallback>
-  </mc:AlternateContent>
 </p:sldLayout>
 </file>
 
@@ -9010,18 +8962,6 @@
   <p:clrMapOvr>
     <a:masterClrMapping/>
   </p:clrMapOvr>
-  <mc:AlternateContent xmlns:mc="http://schemas.openxmlformats.org/markup-compatibility/2006">
-    <mc:Choice xmlns:p14="http://schemas.microsoft.com/office/powerpoint/2010/main" Requires="p14">
-      <p:transition spd="slow" p14:dur="800">
-        <p14:glitter dir="r" pattern="hexagon"/>
-      </p:transition>
-    </mc:Choice>
-    <mc:Fallback>
-      <p:transition spd="slow">
-        <p:fade/>
-      </p:transition>
-    </mc:Fallback>
-  </mc:AlternateContent>
 </p:sldLayout>
 </file>
 
@@ -9275,18 +9215,6 @@
   <p:clrMapOvr>
     <a:masterClrMapping/>
   </p:clrMapOvr>
-  <mc:AlternateContent xmlns:mc="http://schemas.openxmlformats.org/markup-compatibility/2006">
-    <mc:Choice xmlns:p14="http://schemas.microsoft.com/office/powerpoint/2010/main" Requires="p14">
-      <p:transition spd="slow" p14:dur="800">
-        <p14:glitter dir="r" pattern="hexagon"/>
-      </p:transition>
-    </mc:Choice>
-    <mc:Fallback>
-      <p:transition spd="slow">
-        <p:fade/>
-      </p:transition>
-    </mc:Fallback>
-  </mc:AlternateContent>
 </p:sldLayout>
 </file>
 
@@ -9579,18 +9507,6 @@
   <p:clrMapOvr>
     <a:masterClrMapping/>
   </p:clrMapOvr>
-  <mc:AlternateContent xmlns:mc="http://schemas.openxmlformats.org/markup-compatibility/2006">
-    <mc:Choice xmlns:p14="http://schemas.microsoft.com/office/powerpoint/2010/main" Requires="p14">
-      <p:transition spd="slow" p14:dur="800">
-        <p14:glitter dir="r" pattern="hexagon"/>
-      </p:transition>
-    </mc:Choice>
-    <mc:Fallback>
-      <p:transition spd="slow">
-        <p:fade/>
-      </p:transition>
-    </mc:Fallback>
-  </mc:AlternateContent>
 </p:sldLayout>
 </file>
 
@@ -10018,18 +9934,6 @@
   <p:clrMapOvr>
     <a:masterClrMapping/>
   </p:clrMapOvr>
-  <mc:AlternateContent xmlns:mc="http://schemas.openxmlformats.org/markup-compatibility/2006">
-    <mc:Choice xmlns:p14="http://schemas.microsoft.com/office/powerpoint/2010/main" Requires="p14">
-      <p:transition spd="slow" p14:dur="800">
-        <p14:glitter dir="r" pattern="hexagon"/>
-      </p:transition>
-    </mc:Choice>
-    <mc:Fallback>
-      <p:transition spd="slow">
-        <p:fade/>
-      </p:transition>
-    </mc:Fallback>
-  </mc:AlternateContent>
 </p:sldLayout>
 </file>
 
@@ -10154,18 +10058,6 @@
   <p:clrMapOvr>
     <a:masterClrMapping/>
   </p:clrMapOvr>
-  <mc:AlternateContent xmlns:mc="http://schemas.openxmlformats.org/markup-compatibility/2006">
-    <mc:Choice xmlns:p14="http://schemas.microsoft.com/office/powerpoint/2010/main" Requires="p14">
-      <p:transition spd="slow" p14:dur="800">
-        <p14:glitter dir="r" pattern="hexagon"/>
-      </p:transition>
-    </mc:Choice>
-    <mc:Fallback>
-      <p:transition spd="slow">
-        <p:fade/>
-      </p:transition>
-    </mc:Fallback>
-  </mc:AlternateContent>
 </p:sldLayout>
 </file>
 
@@ -10268,18 +10160,6 @@
   <p:clrMapOvr>
     <a:masterClrMapping/>
   </p:clrMapOvr>
-  <mc:AlternateContent xmlns:mc="http://schemas.openxmlformats.org/markup-compatibility/2006">
-    <mc:Choice xmlns:p14="http://schemas.microsoft.com/office/powerpoint/2010/main" Requires="p14">
-      <p:transition spd="slow" p14:dur="800">
-        <p14:glitter dir="r" pattern="hexagon"/>
-      </p:transition>
-    </mc:Choice>
-    <mc:Fallback>
-      <p:transition spd="slow">
-        <p:fade/>
-      </p:transition>
-    </mc:Fallback>
-  </mc:AlternateContent>
 </p:sldLayout>
 </file>
 
@@ -10562,18 +10442,6 @@
   <p:clrMapOvr>
     <a:masterClrMapping/>
   </p:clrMapOvr>
-  <mc:AlternateContent xmlns:mc="http://schemas.openxmlformats.org/markup-compatibility/2006">
-    <mc:Choice xmlns:p14="http://schemas.microsoft.com/office/powerpoint/2010/main" Requires="p14">
-      <p:transition spd="slow" p14:dur="800">
-        <p14:glitter dir="r" pattern="hexagon"/>
-      </p:transition>
-    </mc:Choice>
-    <mc:Fallback>
-      <p:transition spd="slow">
-        <p:fade/>
-      </p:transition>
-    </mc:Fallback>
-  </mc:AlternateContent>
 </p:sldLayout>
 </file>
 
@@ -10836,18 +10704,6 @@
   <p:clrMapOvr>
     <a:masterClrMapping/>
   </p:clrMapOvr>
-  <mc:AlternateContent xmlns:mc="http://schemas.openxmlformats.org/markup-compatibility/2006">
-    <mc:Choice xmlns:p14="http://schemas.microsoft.com/office/powerpoint/2010/main" Requires="p14">
-      <p:transition spd="slow" p14:dur="800">
-        <p14:glitter dir="r" pattern="hexagon"/>
-      </p:transition>
-    </mc:Choice>
-    <mc:Fallback>
-      <p:transition spd="slow">
-        <p:fade/>
-      </p:transition>
-    </mc:Fallback>
-  </mc:AlternateContent>
 </p:sldLayout>
 </file>
 
@@ -11212,18 +11068,6 @@
     <p:sldLayoutId id="2147483659" r:id="rId11"/>
     <p:sldLayoutId id="2147483660" r:id="rId12"/>
   </p:sldLayoutIdLst>
-  <mc:AlternateContent xmlns:mc="http://schemas.openxmlformats.org/markup-compatibility/2006">
-    <mc:Choice xmlns:p14="http://schemas.microsoft.com/office/powerpoint/2010/main" Requires="p14">
-      <p:transition spd="slow" p14:dur="800">
-        <p14:glitter dir="r" pattern="hexagon"/>
-      </p:transition>
-    </mc:Choice>
-    <mc:Fallback>
-      <p:transition spd="slow">
-        <p:fade/>
-      </p:transition>
-    </mc:Fallback>
-  </mc:AlternateContent>
   <p:hf hdr="0" ftr="0" dt="0"/>
   <p:txStyles>
     <p:titleStyle>
@@ -12179,14 +12023,6 @@
   <p:clrMapOvr>
     <a:masterClrMapping/>
   </p:clrMapOvr>
-  <mc:AlternateContent xmlns:mc="http://schemas.openxmlformats.org/markup-compatibility/2006">
-    <mc:Choice xmlns:p14="http://schemas.microsoft.com/office/powerpoint/2010/main" Requires="p14">
-      <p:transition p14:dur="0"/>
-    </mc:Choice>
-    <mc:Fallback>
-      <p:transition/>
-    </mc:Fallback>
-  </mc:AlternateContent>
 </p:sld>
 </file>
 
@@ -12670,18 +12506,6 @@
   <p:clrMapOvr>
     <a:masterClrMapping/>
   </p:clrMapOvr>
-  <mc:AlternateContent xmlns:mc="http://schemas.openxmlformats.org/markup-compatibility/2006">
-    <mc:Choice xmlns:p14="http://schemas.microsoft.com/office/powerpoint/2010/main" Requires="p14">
-      <p:transition spd="slow" p14:dur="800">
-        <p14:glitter dir="r" pattern="hexagon"/>
-      </p:transition>
-    </mc:Choice>
-    <mc:Fallback>
-      <p:transition spd="slow">
-        <p:fade/>
-      </p:transition>
-    </mc:Fallback>
-  </mc:AlternateContent>
 </p:sld>
 </file>
 
@@ -13535,18 +13359,6 @@
   <p:clrMapOvr>
     <a:masterClrMapping/>
   </p:clrMapOvr>
-  <mc:AlternateContent xmlns:mc="http://schemas.openxmlformats.org/markup-compatibility/2006">
-    <mc:Choice xmlns:p14="http://schemas.microsoft.com/office/powerpoint/2010/main" Requires="p14">
-      <p:transition spd="slow" p14:dur="800">
-        <p14:glitter dir="r" pattern="hexagon"/>
-      </p:transition>
-    </mc:Choice>
-    <mc:Fallback>
-      <p:transition spd="slow">
-        <p:fade/>
-      </p:transition>
-    </mc:Fallback>
-  </mc:AlternateContent>
 </p:sld>
 </file>
 
@@ -14037,18 +13849,6 @@
   <p:clrMapOvr>
     <a:masterClrMapping/>
   </p:clrMapOvr>
-  <mc:AlternateContent xmlns:mc="http://schemas.openxmlformats.org/markup-compatibility/2006">
-    <mc:Choice xmlns:p14="http://schemas.microsoft.com/office/powerpoint/2010/main" Requires="p14">
-      <p:transition spd="slow" p14:dur="800">
-        <p14:glitter dir="r" pattern="hexagon"/>
-      </p:transition>
-    </mc:Choice>
-    <mc:Fallback>
-      <p:transition spd="slow">
-        <p:fade/>
-      </p:transition>
-    </mc:Fallback>
-  </mc:AlternateContent>
 </p:sld>
 </file>
 
@@ -14726,18 +14526,6 @@
   <p:clrMapOvr>
     <a:masterClrMapping/>
   </p:clrMapOvr>
-  <mc:AlternateContent xmlns:mc="http://schemas.openxmlformats.org/markup-compatibility/2006">
-    <mc:Choice xmlns:p14="http://schemas.microsoft.com/office/powerpoint/2010/main" Requires="p14">
-      <p:transition spd="slow" p14:dur="800">
-        <p14:glitter dir="r" pattern="hexagon"/>
-      </p:transition>
-    </mc:Choice>
-    <mc:Fallback>
-      <p:transition spd="slow">
-        <p:fade/>
-      </p:transition>
-    </mc:Fallback>
-  </mc:AlternateContent>
 </p:sld>
 </file>
 
@@ -15316,18 +15104,6 @@
   <p:clrMapOvr>
     <a:masterClrMapping/>
   </p:clrMapOvr>
-  <mc:AlternateContent xmlns:mc="http://schemas.openxmlformats.org/markup-compatibility/2006">
-    <mc:Choice xmlns:p14="http://schemas.microsoft.com/office/powerpoint/2010/main" Requires="p14">
-      <p:transition spd="slow" p14:dur="800">
-        <p14:glitter dir="r" pattern="hexagon"/>
-      </p:transition>
-    </mc:Choice>
-    <mc:Fallback>
-      <p:transition spd="slow">
-        <p:fade/>
-      </p:transition>
-    </mc:Fallback>
-  </mc:AlternateContent>
 </p:sld>
 </file>
 
@@ -15862,18 +15638,6 @@
   <p:clrMapOvr>
     <a:masterClrMapping/>
   </p:clrMapOvr>
-  <mc:AlternateContent xmlns:mc="http://schemas.openxmlformats.org/markup-compatibility/2006">
-    <mc:Choice xmlns:p14="http://schemas.microsoft.com/office/powerpoint/2010/main" Requires="p14">
-      <p:transition spd="slow" p14:dur="800">
-        <p14:glitter dir="r" pattern="hexagon"/>
-      </p:transition>
-    </mc:Choice>
-    <mc:Fallback>
-      <p:transition spd="slow">
-        <p:fade/>
-      </p:transition>
-    </mc:Fallback>
-  </mc:AlternateContent>
 </p:sld>
 </file>
 
@@ -17212,18 +16976,6 @@
   <p:clrMapOvr>
     <a:masterClrMapping/>
   </p:clrMapOvr>
-  <mc:AlternateContent xmlns:mc="http://schemas.openxmlformats.org/markup-compatibility/2006">
-    <mc:Choice xmlns:p14="http://schemas.microsoft.com/office/powerpoint/2010/main" Requires="p14">
-      <p:transition spd="slow" p14:dur="800">
-        <p14:glitter dir="r" pattern="hexagon"/>
-      </p:transition>
-    </mc:Choice>
-    <mc:Fallback>
-      <p:transition spd="slow">
-        <p:fade/>
-      </p:transition>
-    </mc:Fallback>
-  </mc:AlternateContent>
 </p:sld>
 </file>
 
@@ -18225,18 +17977,6 @@
   <p:clrMapOvr>
     <a:masterClrMapping/>
   </p:clrMapOvr>
-  <mc:AlternateContent xmlns:mc="http://schemas.openxmlformats.org/markup-compatibility/2006">
-    <mc:Choice xmlns:p14="http://schemas.microsoft.com/office/powerpoint/2010/main" Requires="p14">
-      <p:transition spd="slow" p14:dur="800">
-        <p14:glitter dir="r" pattern="hexagon"/>
-      </p:transition>
-    </mc:Choice>
-    <mc:Fallback>
-      <p:transition spd="slow">
-        <p:fade/>
-      </p:transition>
-    </mc:Fallback>
-  </mc:AlternateContent>
 </p:sld>
 </file>
 
@@ -19258,18 +18998,6 @@
   <p:clrMapOvr>
     <a:masterClrMapping/>
   </p:clrMapOvr>
-  <mc:AlternateContent xmlns:mc="http://schemas.openxmlformats.org/markup-compatibility/2006">
-    <mc:Choice xmlns:p14="http://schemas.microsoft.com/office/powerpoint/2010/main" Requires="p14">
-      <p:transition spd="slow" p14:dur="800">
-        <p14:glitter dir="r" pattern="hexagon"/>
-      </p:transition>
-    </mc:Choice>
-    <mc:Fallback>
-      <p:transition spd="slow">
-        <p:fade/>
-      </p:transition>
-    </mc:Fallback>
-  </mc:AlternateContent>
 </p:sld>
 </file>
 
@@ -20339,18 +20067,6 @@
   <p:clrMapOvr>
     <a:masterClrMapping/>
   </p:clrMapOvr>
-  <mc:AlternateContent xmlns:mc="http://schemas.openxmlformats.org/markup-compatibility/2006">
-    <mc:Choice xmlns:p14="http://schemas.microsoft.com/office/powerpoint/2010/main" Requires="p14">
-      <p:transition spd="slow" p14:dur="800">
-        <p14:glitter dir="r" pattern="hexagon"/>
-      </p:transition>
-    </mc:Choice>
-    <mc:Fallback>
-      <p:transition spd="slow">
-        <p:fade/>
-      </p:transition>
-    </mc:Fallback>
-  </mc:AlternateContent>
 </p:sld>
 </file>
 
@@ -21141,18 +20857,6 @@
   <p:clrMapOvr>
     <a:masterClrMapping/>
   </p:clrMapOvr>
-  <mc:AlternateContent xmlns:mc="http://schemas.openxmlformats.org/markup-compatibility/2006">
-    <mc:Choice xmlns:p14="http://schemas.microsoft.com/office/powerpoint/2010/main" Requires="p14">
-      <p:transition>
-        <p14:glitter dir="r" pattern="hexagon"/>
-      </p:transition>
-    </mc:Choice>
-    <mc:Fallback>
-      <p:transition>
-        <p:fade/>
-      </p:transition>
-    </mc:Fallback>
-  </mc:AlternateContent>
 </p:sld>
 </file>
 
@@ -22303,18 +22007,6 @@
   <p:clrMapOvr>
     <a:masterClrMapping/>
   </p:clrMapOvr>
-  <mc:AlternateContent xmlns:mc="http://schemas.openxmlformats.org/markup-compatibility/2006">
-    <mc:Choice xmlns:p14="http://schemas.microsoft.com/office/powerpoint/2010/main" Requires="p14">
-      <p:transition spd="slow" p14:dur="800">
-        <p14:glitter dir="r" pattern="hexagon"/>
-      </p:transition>
-    </mc:Choice>
-    <mc:Fallback>
-      <p:transition spd="slow">
-        <p:fade/>
-      </p:transition>
-    </mc:Fallback>
-  </mc:AlternateContent>
 </p:sld>
 </file>
 
@@ -23288,18 +22980,6 @@
   <p:clrMapOvr>
     <a:masterClrMapping/>
   </p:clrMapOvr>
-  <mc:AlternateContent xmlns:mc="http://schemas.openxmlformats.org/markup-compatibility/2006">
-    <mc:Choice xmlns:p14="http://schemas.microsoft.com/office/powerpoint/2010/main" Requires="p14">
-      <p:transition spd="slow" p14:dur="800">
-        <p14:glitter dir="r" pattern="hexagon"/>
-      </p:transition>
-    </mc:Choice>
-    <mc:Fallback>
-      <p:transition spd="slow">
-        <p:fade/>
-      </p:transition>
-    </mc:Fallback>
-  </mc:AlternateContent>
 </p:sld>
 </file>
 
@@ -24325,18 +24005,6 @@
   <p:clrMapOvr>
     <a:masterClrMapping/>
   </p:clrMapOvr>
-  <mc:AlternateContent xmlns:mc="http://schemas.openxmlformats.org/markup-compatibility/2006">
-    <mc:Choice xmlns:p14="http://schemas.microsoft.com/office/powerpoint/2010/main" Requires="p14">
-      <p:transition spd="slow" p14:dur="800">
-        <p14:glitter dir="r" pattern="hexagon"/>
-      </p:transition>
-    </mc:Choice>
-    <mc:Fallback>
-      <p:transition spd="slow">
-        <p:fade/>
-      </p:transition>
-    </mc:Fallback>
-  </mc:AlternateContent>
 </p:sld>
 </file>
 
@@ -25432,18 +25100,6 @@
   <p:clrMapOvr>
     <a:masterClrMapping/>
   </p:clrMapOvr>
-  <mc:AlternateContent xmlns:mc="http://schemas.openxmlformats.org/markup-compatibility/2006">
-    <mc:Choice xmlns:p14="http://schemas.microsoft.com/office/powerpoint/2010/main" Requires="p14">
-      <p:transition spd="slow" p14:dur="800">
-        <p14:glitter dir="r" pattern="hexagon"/>
-      </p:transition>
-    </mc:Choice>
-    <mc:Fallback>
-      <p:transition spd="slow">
-        <p:fade/>
-      </p:transition>
-    </mc:Fallback>
-  </mc:AlternateContent>
 </p:sld>
 </file>
 
@@ -26501,18 +26157,6 @@
   <p:clrMapOvr>
     <a:masterClrMapping/>
   </p:clrMapOvr>
-  <mc:AlternateContent xmlns:mc="http://schemas.openxmlformats.org/markup-compatibility/2006">
-    <mc:Choice xmlns:p14="http://schemas.microsoft.com/office/powerpoint/2010/main" Requires="p14">
-      <p:transition spd="slow" p14:dur="800">
-        <p14:glitter dir="r" pattern="hexagon"/>
-      </p:transition>
-    </mc:Choice>
-    <mc:Fallback>
-      <p:transition spd="slow">
-        <p:fade/>
-      </p:transition>
-    </mc:Fallback>
-  </mc:AlternateContent>
 </p:sld>
 </file>
 
@@ -27543,18 +27187,6 @@
   <p:clrMapOvr>
     <a:masterClrMapping/>
   </p:clrMapOvr>
-  <mc:AlternateContent xmlns:mc="http://schemas.openxmlformats.org/markup-compatibility/2006">
-    <mc:Choice xmlns:p14="http://schemas.microsoft.com/office/powerpoint/2010/main" Requires="p14">
-      <p:transition spd="slow" p14:dur="800">
-        <p14:glitter dir="r" pattern="hexagon"/>
-      </p:transition>
-    </mc:Choice>
-    <mc:Fallback>
-      <p:transition spd="slow">
-        <p:fade/>
-      </p:transition>
-    </mc:Fallback>
-  </mc:AlternateContent>
 </p:sld>
 </file>
 
@@ -28580,18 +28212,6 @@
   <p:clrMapOvr>
     <a:masterClrMapping/>
   </p:clrMapOvr>
-  <mc:AlternateContent xmlns:mc="http://schemas.openxmlformats.org/markup-compatibility/2006">
-    <mc:Choice xmlns:p14="http://schemas.microsoft.com/office/powerpoint/2010/main" Requires="p14">
-      <p:transition spd="slow" p14:dur="800">
-        <p14:glitter dir="r" pattern="hexagon"/>
-      </p:transition>
-    </mc:Choice>
-    <mc:Fallback>
-      <p:transition spd="slow">
-        <p:fade/>
-      </p:transition>
-    </mc:Fallback>
-  </mc:AlternateContent>
 </p:sld>
 </file>
 
@@ -29617,18 +29237,6 @@
   <p:clrMapOvr>
     <a:masterClrMapping/>
   </p:clrMapOvr>
-  <mc:AlternateContent xmlns:mc="http://schemas.openxmlformats.org/markup-compatibility/2006">
-    <mc:Choice xmlns:p14="http://schemas.microsoft.com/office/powerpoint/2010/main" Requires="p14">
-      <p:transition spd="slow" p14:dur="800">
-        <p14:glitter dir="r" pattern="hexagon"/>
-      </p:transition>
-    </mc:Choice>
-    <mc:Fallback>
-      <p:transition spd="slow">
-        <p:fade/>
-      </p:transition>
-    </mc:Fallback>
-  </mc:AlternateContent>
 </p:sld>
 </file>
 
@@ -29870,18 +29478,6 @@
   <p:clrMapOvr>
     <a:masterClrMapping/>
   </p:clrMapOvr>
-  <mc:AlternateContent xmlns:mc="http://schemas.openxmlformats.org/markup-compatibility/2006">
-    <mc:Choice xmlns:p14="http://schemas.microsoft.com/office/powerpoint/2010/main" Requires="p14">
-      <p:transition spd="slow" p14:dur="800">
-        <p14:glitter dir="r" pattern="hexagon"/>
-      </p:transition>
-    </mc:Choice>
-    <mc:Fallback>
-      <p:transition spd="slow">
-        <p:fade/>
-      </p:transition>
-    </mc:Fallback>
-  </mc:AlternateContent>
 </p:sld>
 </file>
 
@@ -30374,18 +29970,6 @@
   <p:clrMapOvr>
     <a:masterClrMapping/>
   </p:clrMapOvr>
-  <mc:AlternateContent xmlns:mc="http://schemas.openxmlformats.org/markup-compatibility/2006">
-    <mc:Choice xmlns:p14="http://schemas.microsoft.com/office/powerpoint/2010/main" Requires="p14">
-      <p:transition spd="slow" p14:dur="800">
-        <p14:glitter dir="r" pattern="hexagon"/>
-      </p:transition>
-    </mc:Choice>
-    <mc:Fallback>
-      <p:transition spd="slow">
-        <p:fade/>
-      </p:transition>
-    </mc:Fallback>
-  </mc:AlternateContent>
 </p:sld>
 </file>
 
@@ -30718,18 +30302,6 @@
   <p:clrMapOvr>
     <a:masterClrMapping/>
   </p:clrMapOvr>
-  <mc:AlternateContent xmlns:mc="http://schemas.openxmlformats.org/markup-compatibility/2006">
-    <mc:Choice xmlns:p14="http://schemas.microsoft.com/office/powerpoint/2010/main" Requires="p14">
-      <p:transition spd="slow" p14:dur="800">
-        <p14:glitter dir="r" pattern="hexagon"/>
-      </p:transition>
-    </mc:Choice>
-    <mc:Fallback>
-      <p:transition spd="slow">
-        <p:fade/>
-      </p:transition>
-    </mc:Fallback>
-  </mc:AlternateContent>
 </p:sld>
 </file>
 
@@ -31086,18 +30658,6 @@
   <p:clrMapOvr>
     <a:masterClrMapping/>
   </p:clrMapOvr>
-  <mc:AlternateContent xmlns:mc="http://schemas.openxmlformats.org/markup-compatibility/2006">
-    <mc:Choice xmlns:p14="http://schemas.microsoft.com/office/powerpoint/2010/main" Requires="p14">
-      <p:transition spd="slow" p14:dur="800">
-        <p14:glitter dir="r" pattern="hexagon"/>
-      </p:transition>
-    </mc:Choice>
-    <mc:Fallback>
-      <p:transition spd="slow">
-        <p:fade/>
-      </p:transition>
-    </mc:Fallback>
-  </mc:AlternateContent>
 </p:sld>
 </file>
 
@@ -32509,18 +32069,6 @@
   <p:clrMapOvr>
     <a:masterClrMapping/>
   </p:clrMapOvr>
-  <mc:AlternateContent xmlns:mc="http://schemas.openxmlformats.org/markup-compatibility/2006">
-    <mc:Choice xmlns:p14="http://schemas.microsoft.com/office/powerpoint/2010/main" Requires="p14">
-      <p:transition spd="slow" p14:dur="800">
-        <p14:glitter dir="r" pattern="hexagon"/>
-      </p:transition>
-    </mc:Choice>
-    <mc:Fallback>
-      <p:transition spd="slow">
-        <p:fade/>
-      </p:transition>
-    </mc:Fallback>
-  </mc:AlternateContent>
 </p:sld>
 </file>
 
@@ -35371,18 +34919,6 @@
   <p:clrMapOvr>
     <a:masterClrMapping/>
   </p:clrMapOvr>
-  <mc:AlternateContent xmlns:mc="http://schemas.openxmlformats.org/markup-compatibility/2006">
-    <mc:Choice xmlns:p14="http://schemas.microsoft.com/office/powerpoint/2010/main" Requires="p14">
-      <p:transition spd="slow" p14:dur="800">
-        <p14:glitter dir="r" pattern="hexagon"/>
-      </p:transition>
-    </mc:Choice>
-    <mc:Fallback>
-      <p:transition spd="slow">
-        <p:fade/>
-      </p:transition>
-    </mc:Fallback>
-  </mc:AlternateContent>
 </p:sld>
 </file>
 
@@ -35909,18 +35445,6 @@
   <p:clrMapOvr>
     <a:masterClrMapping/>
   </p:clrMapOvr>
-  <mc:AlternateContent xmlns:mc="http://schemas.openxmlformats.org/markup-compatibility/2006">
-    <mc:Choice xmlns:p14="http://schemas.microsoft.com/office/powerpoint/2010/main" Requires="p14">
-      <p:transition spd="slow" p14:dur="800">
-        <p14:glitter dir="r" pattern="hexagon"/>
-      </p:transition>
-    </mc:Choice>
-    <mc:Fallback>
-      <p:transition spd="slow">
-        <p:fade/>
-      </p:transition>
-    </mc:Fallback>
-  </mc:AlternateContent>
 </p:sld>
 </file>
 
@@ -36313,18 +35837,6 @@
   <p:clrMapOvr>
     <a:masterClrMapping/>
   </p:clrMapOvr>
-  <mc:AlternateContent xmlns:mc="http://schemas.openxmlformats.org/markup-compatibility/2006">
-    <mc:Choice xmlns:p14="http://schemas.microsoft.com/office/powerpoint/2010/main" Requires="p14">
-      <p:transition spd="slow" p14:dur="800">
-        <p14:glitter dir="r" pattern="hexagon"/>
-      </p:transition>
-    </mc:Choice>
-    <mc:Fallback>
-      <p:transition spd="slow">
-        <p:fade/>
-      </p:transition>
-    </mc:Fallback>
-  </mc:AlternateContent>
 </p:sld>
 </file>
 
@@ -36855,18 +36367,6 @@
   <p:clrMapOvr>
     <a:masterClrMapping/>
   </p:clrMapOvr>
-  <mc:AlternateContent xmlns:mc="http://schemas.openxmlformats.org/markup-compatibility/2006">
-    <mc:Choice xmlns:p14="http://schemas.microsoft.com/office/powerpoint/2010/main" Requires="p14">
-      <p:transition spd="slow" p14:dur="800">
-        <p14:glitter dir="r" pattern="hexagon"/>
-      </p:transition>
-    </mc:Choice>
-    <mc:Fallback>
-      <p:transition spd="slow">
-        <p:fade/>
-      </p:transition>
-    </mc:Fallback>
-  </mc:AlternateContent>
 </p:sld>
 </file>
 
@@ -39424,18 +38924,6 @@
   <p:clrMapOvr>
     <a:masterClrMapping/>
   </p:clrMapOvr>
-  <mc:AlternateContent xmlns:mc="http://schemas.openxmlformats.org/markup-compatibility/2006">
-    <mc:Choice xmlns:p14="http://schemas.microsoft.com/office/powerpoint/2010/main" Requires="p14">
-      <p:transition spd="slow" p14:dur="800">
-        <p14:glitter dir="r" pattern="hexagon"/>
-      </p:transition>
-    </mc:Choice>
-    <mc:Fallback>
-      <p:transition spd="slow">
-        <p:fade/>
-      </p:transition>
-    </mc:Fallback>
-  </mc:AlternateContent>
 </p:sld>
 </file>
 
@@ -39756,18 +39244,6 @@
   <p:clrMapOvr>
     <a:masterClrMapping/>
   </p:clrMapOvr>
-  <mc:AlternateContent xmlns:mc="http://schemas.openxmlformats.org/markup-compatibility/2006">
-    <mc:Choice xmlns:p14="http://schemas.microsoft.com/office/powerpoint/2010/main" Requires="p14">
-      <p:transition spd="slow" p14:dur="800">
-        <p14:glitter dir="r" pattern="hexagon"/>
-      </p:transition>
-    </mc:Choice>
-    <mc:Fallback>
-      <p:transition spd="slow">
-        <p:fade/>
-      </p:transition>
-    </mc:Fallback>
-  </mc:AlternateContent>
 </p:sld>
 </file>
 
@@ -39999,18 +39475,6 @@
   <p:clrMapOvr>
     <a:masterClrMapping/>
   </p:clrMapOvr>
-  <mc:AlternateContent xmlns:mc="http://schemas.openxmlformats.org/markup-compatibility/2006">
-    <mc:Choice xmlns:p14="http://schemas.microsoft.com/office/powerpoint/2010/main" Requires="p14">
-      <p:transition spd="slow" p14:dur="800">
-        <p14:glitter dir="r" pattern="hexagon"/>
-      </p:transition>
-    </mc:Choice>
-    <mc:Fallback>
-      <p:transition spd="slow">
-        <p:fade/>
-      </p:transition>
-    </mc:Fallback>
-  </mc:AlternateContent>
 </p:sld>
 </file>
 
@@ -40502,18 +39966,6 @@
   <p:clrMapOvr>
     <a:masterClrMapping/>
   </p:clrMapOvr>
-  <mc:AlternateContent xmlns:mc="http://schemas.openxmlformats.org/markup-compatibility/2006">
-    <mc:Choice xmlns:p14="http://schemas.microsoft.com/office/powerpoint/2010/main" Requires="p14">
-      <p:transition spd="slow" p14:dur="800">
-        <p14:glitter dir="r" pattern="hexagon"/>
-      </p:transition>
-    </mc:Choice>
-    <mc:Fallback>
-      <p:transition spd="slow">
-        <p:fade/>
-      </p:transition>
-    </mc:Fallback>
-  </mc:AlternateContent>
 </p:sld>
 </file>
 
@@ -40995,18 +40447,6 @@
   <p:clrMapOvr>
     <a:masterClrMapping/>
   </p:clrMapOvr>
-  <mc:AlternateContent xmlns:mc="http://schemas.openxmlformats.org/markup-compatibility/2006">
-    <mc:Choice xmlns:p14="http://schemas.microsoft.com/office/powerpoint/2010/main" Requires="p14">
-      <p:transition spd="slow" p14:dur="800">
-        <p14:glitter dir="r" pattern="hexagon"/>
-      </p:transition>
-    </mc:Choice>
-    <mc:Fallback>
-      <p:transition spd="slow">
-        <p:fade/>
-      </p:transition>
-    </mc:Fallback>
-  </mc:AlternateContent>
 </p:sld>
 </file>
 
@@ -42944,29 +42384,8 @@
                           <a:ea typeface="+mn-ea"/>
                           <a:cs typeface="+mn-cs"/>
                         </a:rPr>
-                        <a:t>Emotive </a:t>
+                        <a:t>Emotive verbal expression</a:t>
                       </a:r>
-                      <a:r>
-                        <a:rPr lang="en-US" sz="1600" b="0" i="0" u="none" strike="noStrike" kern="1200">
-                          <a:solidFill>
-                            <a:schemeClr val="bg1"/>
-                          </a:solidFill>
-                          <a:effectLst/>
-                          <a:latin typeface="DIN Alternate" panose="020B0500000000000000" pitchFamily="34" charset="77"/>
-                          <a:ea typeface="+mn-ea"/>
-                          <a:cs typeface="+mn-cs"/>
-                        </a:rPr>
-                        <a:t>verbal expression</a:t>
-                      </a:r>
-                      <a:endParaRPr lang="en-US" sz="1600" b="0" i="0" u="none" strike="noStrike" kern="1200" dirty="0">
-                        <a:solidFill>
-                          <a:schemeClr val="bg1"/>
-                        </a:solidFill>
-                        <a:effectLst/>
-                        <a:latin typeface="DIN Alternate" panose="020B0500000000000000" pitchFamily="34" charset="77"/>
-                        <a:ea typeface="+mn-ea"/>
-                        <a:cs typeface="+mn-cs"/>
-                      </a:endParaRPr>
                     </a:p>
                   </a:txBody>
                   <a:tcPr anchor="ctr">
@@ -44888,18 +44307,6 @@
   <p:clrMapOvr>
     <a:masterClrMapping/>
   </p:clrMapOvr>
-  <mc:AlternateContent xmlns:mc="http://schemas.openxmlformats.org/markup-compatibility/2006">
-    <mc:Choice xmlns:p14="http://schemas.microsoft.com/office/powerpoint/2010/main" Requires="p14">
-      <p:transition spd="slow" p14:dur="800">
-        <p14:glitter dir="r" pattern="hexagon"/>
-      </p:transition>
-    </mc:Choice>
-    <mc:Fallback>
-      <p:transition spd="slow">
-        <p:fade/>
-      </p:transition>
-    </mc:Fallback>
-  </mc:AlternateContent>
 </p:sld>
 </file>
 
@@ -45444,18 +44851,6 @@
   <p:clrMapOvr>
     <a:masterClrMapping/>
   </p:clrMapOvr>
-  <mc:AlternateContent xmlns:mc="http://schemas.openxmlformats.org/markup-compatibility/2006">
-    <mc:Choice xmlns:p14="http://schemas.microsoft.com/office/powerpoint/2010/main" Requires="p14">
-      <p:transition spd="slow" p14:dur="800">
-        <p14:glitter dir="r" pattern="hexagon"/>
-      </p:transition>
-    </mc:Choice>
-    <mc:Fallback>
-      <p:transition spd="slow">
-        <p:fade/>
-      </p:transition>
-    </mc:Fallback>
-  </mc:AlternateContent>
 </p:sld>
 </file>
 

</xml_diff>

<commit_message>
revise: a few minor tweaks to presentation
</commit_message>
<xml_diff>
--- a/docs/FinalSeminarPresentation.pptx
+++ b/docs/FinalSeminarPresentation.pptx
@@ -8296,6 +8296,9 @@
   <p:clrMapOvr>
     <a:masterClrMapping/>
   </p:clrMapOvr>
+  <p:transition>
+    <p:fade/>
+  </p:transition>
 </p:sldLayout>
 </file>
 
@@ -8471,6 +8474,9 @@
   <p:clrMapOvr>
     <a:masterClrMapping/>
   </p:clrMapOvr>
+  <p:transition>
+    <p:fade/>
+  </p:transition>
 </p:sldLayout>
 </file>
 
@@ -8656,6 +8662,9 @@
   <p:clrMapOvr>
     <a:masterClrMapping/>
   </p:clrMapOvr>
+  <p:transition>
+    <p:fade/>
+  </p:transition>
 </p:sldLayout>
 </file>
 
@@ -8787,6 +8796,9 @@
   <p:clrMapOvr>
     <a:masterClrMapping/>
   </p:clrMapOvr>
+  <p:transition>
+    <p:fade/>
+  </p:transition>
 </p:sldLayout>
 </file>
 
@@ -8962,6 +8974,9 @@
   <p:clrMapOvr>
     <a:masterClrMapping/>
   </p:clrMapOvr>
+  <p:transition>
+    <p:fade/>
+  </p:transition>
 </p:sldLayout>
 </file>
 
@@ -9215,6 +9230,9 @@
   <p:clrMapOvr>
     <a:masterClrMapping/>
   </p:clrMapOvr>
+  <p:transition>
+    <p:fade/>
+  </p:transition>
 </p:sldLayout>
 </file>
 
@@ -9507,6 +9525,9 @@
   <p:clrMapOvr>
     <a:masterClrMapping/>
   </p:clrMapOvr>
+  <p:transition>
+    <p:fade/>
+  </p:transition>
 </p:sldLayout>
 </file>
 
@@ -9934,6 +9955,9 @@
   <p:clrMapOvr>
     <a:masterClrMapping/>
   </p:clrMapOvr>
+  <p:transition>
+    <p:fade/>
+  </p:transition>
 </p:sldLayout>
 </file>
 
@@ -10058,6 +10082,9 @@
   <p:clrMapOvr>
     <a:masterClrMapping/>
   </p:clrMapOvr>
+  <p:transition>
+    <p:fade/>
+  </p:transition>
 </p:sldLayout>
 </file>
 
@@ -10160,6 +10187,9 @@
   <p:clrMapOvr>
     <a:masterClrMapping/>
   </p:clrMapOvr>
+  <p:transition>
+    <p:fade/>
+  </p:transition>
 </p:sldLayout>
 </file>
 
@@ -10442,6 +10472,9 @@
   <p:clrMapOvr>
     <a:masterClrMapping/>
   </p:clrMapOvr>
+  <p:transition>
+    <p:fade/>
+  </p:transition>
 </p:sldLayout>
 </file>
 
@@ -10704,6 +10737,9 @@
   <p:clrMapOvr>
     <a:masterClrMapping/>
   </p:clrMapOvr>
+  <p:transition>
+    <p:fade/>
+  </p:transition>
 </p:sldLayout>
 </file>
 
@@ -11068,6 +11104,9 @@
     <p:sldLayoutId id="2147483659" r:id="rId11"/>
     <p:sldLayoutId id="2147483660" r:id="rId12"/>
   </p:sldLayoutIdLst>
+  <p:transition>
+    <p:fade/>
+  </p:transition>
   <p:hf hdr="0" ftr="0" dt="0"/>
   <p:txStyles>
     <p:titleStyle>
@@ -12023,6 +12062,9 @@
   <p:clrMapOvr>
     <a:masterClrMapping/>
   </p:clrMapOvr>
+  <p:transition>
+    <p:fade/>
+  </p:transition>
 </p:sld>
 </file>
 
@@ -12506,6 +12548,9 @@
   <p:clrMapOvr>
     <a:masterClrMapping/>
   </p:clrMapOvr>
+  <p:transition>
+    <p:fade/>
+  </p:transition>
 </p:sld>
 </file>
 
@@ -13359,6 +13404,9 @@
   <p:clrMapOvr>
     <a:masterClrMapping/>
   </p:clrMapOvr>
+  <p:transition>
+    <p:fade/>
+  </p:transition>
 </p:sld>
 </file>
 
@@ -13849,6 +13897,9 @@
   <p:clrMapOvr>
     <a:masterClrMapping/>
   </p:clrMapOvr>
+  <p:transition>
+    <p:fade/>
+  </p:transition>
 </p:sld>
 </file>
 
@@ -14526,6 +14577,9 @@
   <p:clrMapOvr>
     <a:masterClrMapping/>
   </p:clrMapOvr>
+  <p:transition>
+    <p:fade/>
+  </p:transition>
 </p:sld>
 </file>
 
@@ -15104,6 +15158,9 @@
   <p:clrMapOvr>
     <a:masterClrMapping/>
   </p:clrMapOvr>
+  <p:transition>
+    <p:fade/>
+  </p:transition>
 </p:sld>
 </file>
 
@@ -15638,6 +15695,9 @@
   <p:clrMapOvr>
     <a:masterClrMapping/>
   </p:clrMapOvr>
+  <p:transition>
+    <p:fade/>
+  </p:transition>
 </p:sld>
 </file>
 
@@ -16976,6 +17036,9 @@
   <p:clrMapOvr>
     <a:masterClrMapping/>
   </p:clrMapOvr>
+  <p:transition>
+    <p:fade/>
+  </p:transition>
 </p:sld>
 </file>
 
@@ -17977,6 +18040,9 @@
   <p:clrMapOvr>
     <a:masterClrMapping/>
   </p:clrMapOvr>
+  <p:transition>
+    <p:fade/>
+  </p:transition>
 </p:sld>
 </file>
 
@@ -18998,6 +19064,9 @@
   <p:clrMapOvr>
     <a:masterClrMapping/>
   </p:clrMapOvr>
+  <p:transition>
+    <p:fade/>
+  </p:transition>
 </p:sld>
 </file>
 
@@ -20067,6 +20136,9 @@
   <p:clrMapOvr>
     <a:masterClrMapping/>
   </p:clrMapOvr>
+  <p:transition>
+    <p:fade/>
+  </p:transition>
 </p:sld>
 </file>
 
@@ -20857,6 +20929,9 @@
   <p:clrMapOvr>
     <a:masterClrMapping/>
   </p:clrMapOvr>
+  <p:transition>
+    <p:fade/>
+  </p:transition>
 </p:sld>
 </file>
 
@@ -22007,6 +22082,9 @@
   <p:clrMapOvr>
     <a:masterClrMapping/>
   </p:clrMapOvr>
+  <p:transition>
+    <p:fade/>
+  </p:transition>
 </p:sld>
 </file>
 
@@ -22980,6 +23058,9 @@
   <p:clrMapOvr>
     <a:masterClrMapping/>
   </p:clrMapOvr>
+  <p:transition>
+    <p:fade/>
+  </p:transition>
 </p:sld>
 </file>
 
@@ -24005,6 +24086,9 @@
   <p:clrMapOvr>
     <a:masterClrMapping/>
   </p:clrMapOvr>
+  <p:transition>
+    <p:fade/>
+  </p:transition>
 </p:sld>
 </file>
 
@@ -25100,6 +25184,9 @@
   <p:clrMapOvr>
     <a:masterClrMapping/>
   </p:clrMapOvr>
+  <p:transition>
+    <p:fade/>
+  </p:transition>
 </p:sld>
 </file>
 
@@ -26157,6 +26244,9 @@
   <p:clrMapOvr>
     <a:masterClrMapping/>
   </p:clrMapOvr>
+  <p:transition>
+    <p:fade/>
+  </p:transition>
 </p:sld>
 </file>
 
@@ -27187,6 +27277,9 @@
   <p:clrMapOvr>
     <a:masterClrMapping/>
   </p:clrMapOvr>
+  <p:transition>
+    <p:fade/>
+  </p:transition>
 </p:sld>
 </file>
 
@@ -28212,6 +28305,9 @@
   <p:clrMapOvr>
     <a:masterClrMapping/>
   </p:clrMapOvr>
+  <p:transition>
+    <p:fade/>
+  </p:transition>
 </p:sld>
 </file>
 
@@ -29237,6 +29333,9 @@
   <p:clrMapOvr>
     <a:masterClrMapping/>
   </p:clrMapOvr>
+  <p:transition>
+    <p:fade/>
+  </p:transition>
 </p:sld>
 </file>
 
@@ -29478,6 +29577,9 @@
   <p:clrMapOvr>
     <a:masterClrMapping/>
   </p:clrMapOvr>
+  <p:transition>
+    <p:fade/>
+  </p:transition>
 </p:sld>
 </file>
 
@@ -29970,6 +30072,9 @@
   <p:clrMapOvr>
     <a:masterClrMapping/>
   </p:clrMapOvr>
+  <p:transition>
+    <p:fade/>
+  </p:transition>
 </p:sld>
 </file>
 
@@ -30302,6 +30407,9 @@
   <p:clrMapOvr>
     <a:masterClrMapping/>
   </p:clrMapOvr>
+  <p:transition>
+    <p:fade/>
+  </p:transition>
 </p:sld>
 </file>
 
@@ -30658,6 +30766,9 @@
   <p:clrMapOvr>
     <a:masterClrMapping/>
   </p:clrMapOvr>
+  <p:transition>
+    <p:fade/>
+  </p:transition>
 </p:sld>
 </file>
 
@@ -32069,6 +32180,9 @@
   <p:clrMapOvr>
     <a:masterClrMapping/>
   </p:clrMapOvr>
+  <p:transition>
+    <p:fade/>
+  </p:transition>
 </p:sld>
 </file>
 
@@ -34919,6 +35033,9 @@
   <p:clrMapOvr>
     <a:masterClrMapping/>
   </p:clrMapOvr>
+  <p:transition>
+    <p:fade/>
+  </p:transition>
 </p:sld>
 </file>
 
@@ -35445,6 +35562,9 @@
   <p:clrMapOvr>
     <a:masterClrMapping/>
   </p:clrMapOvr>
+  <p:transition>
+    <p:fade/>
+  </p:transition>
 </p:sld>
 </file>
 
@@ -35837,6 +35957,9 @@
   <p:clrMapOvr>
     <a:masterClrMapping/>
   </p:clrMapOvr>
+  <p:transition>
+    <p:fade/>
+  </p:transition>
 </p:sld>
 </file>
 
@@ -36367,6 +36490,9 @@
   <p:clrMapOvr>
     <a:masterClrMapping/>
   </p:clrMapOvr>
+  <p:transition>
+    <p:fade/>
+  </p:transition>
 </p:sld>
 </file>
 
@@ -38924,6 +39050,9 @@
   <p:clrMapOvr>
     <a:masterClrMapping/>
   </p:clrMapOvr>
+  <p:transition>
+    <p:fade/>
+  </p:transition>
 </p:sld>
 </file>
 
@@ -39244,6 +39373,9 @@
   <p:clrMapOvr>
     <a:masterClrMapping/>
   </p:clrMapOvr>
+  <p:transition>
+    <p:fade/>
+  </p:transition>
 </p:sld>
 </file>
 
@@ -39475,6 +39607,9 @@
   <p:clrMapOvr>
     <a:masterClrMapping/>
   </p:clrMapOvr>
+  <p:transition>
+    <p:fade/>
+  </p:transition>
 </p:sld>
 </file>
 
@@ -39966,6 +40101,9 @@
   <p:clrMapOvr>
     <a:masterClrMapping/>
   </p:clrMapOvr>
+  <p:transition>
+    <p:fade/>
+  </p:transition>
 </p:sld>
 </file>
 
@@ -40447,6 +40585,9 @@
   <p:clrMapOvr>
     <a:masterClrMapping/>
   </p:clrMapOvr>
+  <p:transition>
+    <p:fade/>
+  </p:transition>
 </p:sld>
 </file>
 
@@ -44307,6 +44448,9 @@
   <p:clrMapOvr>
     <a:masterClrMapping/>
   </p:clrMapOvr>
+  <p:transition>
+    <p:fade/>
+  </p:transition>
 </p:sld>
 </file>
 
@@ -44851,6 +44995,9 @@
   <p:clrMapOvr>
     <a:masterClrMapping/>
   </p:clrMapOvr>
+  <p:transition>
+    <p:fade/>
+  </p:transition>
 </p:sld>
 </file>
 

</xml_diff>

<commit_message>
revise: edits to report and presentation
</commit_message>
<xml_diff>
--- a/docs/FinalSeminarPresentation.pptx
+++ b/docs/FinalSeminarPresentation.pptx
@@ -8296,9 +8296,18 @@
   <p:clrMapOvr>
     <a:masterClrMapping/>
   </p:clrMapOvr>
-  <p:transition>
-    <p:fade/>
-  </p:transition>
+  <mc:AlternateContent xmlns:mc="http://schemas.openxmlformats.org/markup-compatibility/2006">
+    <mc:Choice xmlns:p14="http://schemas.microsoft.com/office/powerpoint/2010/main" Requires="p14">
+      <p:transition p14:dur="250">
+        <p:fade/>
+      </p:transition>
+    </mc:Choice>
+    <mc:Fallback>
+      <p:transition>
+        <p:fade/>
+      </p:transition>
+    </mc:Fallback>
+  </mc:AlternateContent>
 </p:sldLayout>
 </file>
 
@@ -8474,9 +8483,18 @@
   <p:clrMapOvr>
     <a:masterClrMapping/>
   </p:clrMapOvr>
-  <p:transition>
-    <p:fade/>
-  </p:transition>
+  <mc:AlternateContent xmlns:mc="http://schemas.openxmlformats.org/markup-compatibility/2006">
+    <mc:Choice xmlns:p14="http://schemas.microsoft.com/office/powerpoint/2010/main" Requires="p14">
+      <p:transition p14:dur="250">
+        <p:fade/>
+      </p:transition>
+    </mc:Choice>
+    <mc:Fallback>
+      <p:transition>
+        <p:fade/>
+      </p:transition>
+    </mc:Fallback>
+  </mc:AlternateContent>
 </p:sldLayout>
 </file>
 
@@ -8662,9 +8680,18 @@
   <p:clrMapOvr>
     <a:masterClrMapping/>
   </p:clrMapOvr>
-  <p:transition>
-    <p:fade/>
-  </p:transition>
+  <mc:AlternateContent xmlns:mc="http://schemas.openxmlformats.org/markup-compatibility/2006">
+    <mc:Choice xmlns:p14="http://schemas.microsoft.com/office/powerpoint/2010/main" Requires="p14">
+      <p:transition p14:dur="250">
+        <p:fade/>
+      </p:transition>
+    </mc:Choice>
+    <mc:Fallback>
+      <p:transition>
+        <p:fade/>
+      </p:transition>
+    </mc:Fallback>
+  </mc:AlternateContent>
 </p:sldLayout>
 </file>
 
@@ -8796,9 +8823,18 @@
   <p:clrMapOvr>
     <a:masterClrMapping/>
   </p:clrMapOvr>
-  <p:transition>
-    <p:fade/>
-  </p:transition>
+  <mc:AlternateContent xmlns:mc="http://schemas.openxmlformats.org/markup-compatibility/2006">
+    <mc:Choice xmlns:p14="http://schemas.microsoft.com/office/powerpoint/2010/main" Requires="p14">
+      <p:transition p14:dur="250">
+        <p:fade/>
+      </p:transition>
+    </mc:Choice>
+    <mc:Fallback>
+      <p:transition>
+        <p:fade/>
+      </p:transition>
+    </mc:Fallback>
+  </mc:AlternateContent>
 </p:sldLayout>
 </file>
 
@@ -8974,9 +9010,18 @@
   <p:clrMapOvr>
     <a:masterClrMapping/>
   </p:clrMapOvr>
-  <p:transition>
-    <p:fade/>
-  </p:transition>
+  <mc:AlternateContent xmlns:mc="http://schemas.openxmlformats.org/markup-compatibility/2006">
+    <mc:Choice xmlns:p14="http://schemas.microsoft.com/office/powerpoint/2010/main" Requires="p14">
+      <p:transition p14:dur="250">
+        <p:fade/>
+      </p:transition>
+    </mc:Choice>
+    <mc:Fallback>
+      <p:transition>
+        <p:fade/>
+      </p:transition>
+    </mc:Fallback>
+  </mc:AlternateContent>
 </p:sldLayout>
 </file>
 
@@ -9230,9 +9275,18 @@
   <p:clrMapOvr>
     <a:masterClrMapping/>
   </p:clrMapOvr>
-  <p:transition>
-    <p:fade/>
-  </p:transition>
+  <mc:AlternateContent xmlns:mc="http://schemas.openxmlformats.org/markup-compatibility/2006">
+    <mc:Choice xmlns:p14="http://schemas.microsoft.com/office/powerpoint/2010/main" Requires="p14">
+      <p:transition p14:dur="250">
+        <p:fade/>
+      </p:transition>
+    </mc:Choice>
+    <mc:Fallback>
+      <p:transition>
+        <p:fade/>
+      </p:transition>
+    </mc:Fallback>
+  </mc:AlternateContent>
 </p:sldLayout>
 </file>
 
@@ -9525,9 +9579,18 @@
   <p:clrMapOvr>
     <a:masterClrMapping/>
   </p:clrMapOvr>
-  <p:transition>
-    <p:fade/>
-  </p:transition>
+  <mc:AlternateContent xmlns:mc="http://schemas.openxmlformats.org/markup-compatibility/2006">
+    <mc:Choice xmlns:p14="http://schemas.microsoft.com/office/powerpoint/2010/main" Requires="p14">
+      <p:transition p14:dur="250">
+        <p:fade/>
+      </p:transition>
+    </mc:Choice>
+    <mc:Fallback>
+      <p:transition>
+        <p:fade/>
+      </p:transition>
+    </mc:Fallback>
+  </mc:AlternateContent>
 </p:sldLayout>
 </file>
 
@@ -9955,9 +10018,18 @@
   <p:clrMapOvr>
     <a:masterClrMapping/>
   </p:clrMapOvr>
-  <p:transition>
-    <p:fade/>
-  </p:transition>
+  <mc:AlternateContent xmlns:mc="http://schemas.openxmlformats.org/markup-compatibility/2006">
+    <mc:Choice xmlns:p14="http://schemas.microsoft.com/office/powerpoint/2010/main" Requires="p14">
+      <p:transition p14:dur="250">
+        <p:fade/>
+      </p:transition>
+    </mc:Choice>
+    <mc:Fallback>
+      <p:transition>
+        <p:fade/>
+      </p:transition>
+    </mc:Fallback>
+  </mc:AlternateContent>
 </p:sldLayout>
 </file>
 
@@ -10082,9 +10154,18 @@
   <p:clrMapOvr>
     <a:masterClrMapping/>
   </p:clrMapOvr>
-  <p:transition>
-    <p:fade/>
-  </p:transition>
+  <mc:AlternateContent xmlns:mc="http://schemas.openxmlformats.org/markup-compatibility/2006">
+    <mc:Choice xmlns:p14="http://schemas.microsoft.com/office/powerpoint/2010/main" Requires="p14">
+      <p:transition p14:dur="250">
+        <p:fade/>
+      </p:transition>
+    </mc:Choice>
+    <mc:Fallback>
+      <p:transition>
+        <p:fade/>
+      </p:transition>
+    </mc:Fallback>
+  </mc:AlternateContent>
 </p:sldLayout>
 </file>
 
@@ -10187,9 +10268,18 @@
   <p:clrMapOvr>
     <a:masterClrMapping/>
   </p:clrMapOvr>
-  <p:transition>
-    <p:fade/>
-  </p:transition>
+  <mc:AlternateContent xmlns:mc="http://schemas.openxmlformats.org/markup-compatibility/2006">
+    <mc:Choice xmlns:p14="http://schemas.microsoft.com/office/powerpoint/2010/main" Requires="p14">
+      <p:transition p14:dur="250">
+        <p:fade/>
+      </p:transition>
+    </mc:Choice>
+    <mc:Fallback>
+      <p:transition>
+        <p:fade/>
+      </p:transition>
+    </mc:Fallback>
+  </mc:AlternateContent>
 </p:sldLayout>
 </file>
 
@@ -10472,9 +10562,18 @@
   <p:clrMapOvr>
     <a:masterClrMapping/>
   </p:clrMapOvr>
-  <p:transition>
-    <p:fade/>
-  </p:transition>
+  <mc:AlternateContent xmlns:mc="http://schemas.openxmlformats.org/markup-compatibility/2006">
+    <mc:Choice xmlns:p14="http://schemas.microsoft.com/office/powerpoint/2010/main" Requires="p14">
+      <p:transition p14:dur="250">
+        <p:fade/>
+      </p:transition>
+    </mc:Choice>
+    <mc:Fallback>
+      <p:transition>
+        <p:fade/>
+      </p:transition>
+    </mc:Fallback>
+  </mc:AlternateContent>
 </p:sldLayout>
 </file>
 
@@ -10737,9 +10836,18 @@
   <p:clrMapOvr>
     <a:masterClrMapping/>
   </p:clrMapOvr>
-  <p:transition>
-    <p:fade/>
-  </p:transition>
+  <mc:AlternateContent xmlns:mc="http://schemas.openxmlformats.org/markup-compatibility/2006">
+    <mc:Choice xmlns:p14="http://schemas.microsoft.com/office/powerpoint/2010/main" Requires="p14">
+      <p:transition p14:dur="250">
+        <p:fade/>
+      </p:transition>
+    </mc:Choice>
+    <mc:Fallback>
+      <p:transition>
+        <p:fade/>
+      </p:transition>
+    </mc:Fallback>
+  </mc:AlternateContent>
 </p:sldLayout>
 </file>
 
@@ -11104,9 +11212,18 @@
     <p:sldLayoutId id="2147483659" r:id="rId11"/>
     <p:sldLayoutId id="2147483660" r:id="rId12"/>
   </p:sldLayoutIdLst>
-  <p:transition>
-    <p:fade/>
-  </p:transition>
+  <mc:AlternateContent xmlns:mc="http://schemas.openxmlformats.org/markup-compatibility/2006">
+    <mc:Choice xmlns:p14="http://schemas.microsoft.com/office/powerpoint/2010/main" Requires="p14">
+      <p:transition p14:dur="250">
+        <p:fade/>
+      </p:transition>
+    </mc:Choice>
+    <mc:Fallback>
+      <p:transition>
+        <p:fade/>
+      </p:transition>
+    </mc:Fallback>
+  </mc:AlternateContent>
   <p:hf hdr="0" ftr="0" dt="0"/>
   <p:txStyles>
     <p:titleStyle>
@@ -12062,9 +12179,14 @@
   <p:clrMapOvr>
     <a:masterClrMapping/>
   </p:clrMapOvr>
-  <p:transition>
-    <p:fade/>
-  </p:transition>
+  <mc:AlternateContent xmlns:mc="http://schemas.openxmlformats.org/markup-compatibility/2006">
+    <mc:Choice xmlns:p14="http://schemas.microsoft.com/office/powerpoint/2010/main" Requires="p14">
+      <p:transition p14:dur="0"/>
+    </mc:Choice>
+    <mc:Fallback>
+      <p:transition/>
+    </mc:Fallback>
+  </mc:AlternateContent>
 </p:sld>
 </file>
 
@@ -12548,9 +12670,18 @@
   <p:clrMapOvr>
     <a:masterClrMapping/>
   </p:clrMapOvr>
-  <p:transition>
-    <p:fade/>
-  </p:transition>
+  <mc:AlternateContent xmlns:mc="http://schemas.openxmlformats.org/markup-compatibility/2006">
+    <mc:Choice xmlns:p14="http://schemas.microsoft.com/office/powerpoint/2010/main" Requires="p14">
+      <p:transition p14:dur="250">
+        <p:fade/>
+      </p:transition>
+    </mc:Choice>
+    <mc:Fallback>
+      <p:transition>
+        <p:fade/>
+      </p:transition>
+    </mc:Fallback>
+  </mc:AlternateContent>
 </p:sld>
 </file>
 
@@ -13404,9 +13535,18 @@
   <p:clrMapOvr>
     <a:masterClrMapping/>
   </p:clrMapOvr>
-  <p:transition>
-    <p:fade/>
-  </p:transition>
+  <mc:AlternateContent xmlns:mc="http://schemas.openxmlformats.org/markup-compatibility/2006">
+    <mc:Choice xmlns:p14="http://schemas.microsoft.com/office/powerpoint/2010/main" Requires="p14">
+      <p:transition p14:dur="250">
+        <p:fade/>
+      </p:transition>
+    </mc:Choice>
+    <mc:Fallback>
+      <p:transition>
+        <p:fade/>
+      </p:transition>
+    </mc:Fallback>
+  </mc:AlternateContent>
 </p:sld>
 </file>
 
@@ -13897,9 +14037,18 @@
   <p:clrMapOvr>
     <a:masterClrMapping/>
   </p:clrMapOvr>
-  <p:transition>
-    <p:fade/>
-  </p:transition>
+  <mc:AlternateContent xmlns:mc="http://schemas.openxmlformats.org/markup-compatibility/2006">
+    <mc:Choice xmlns:p14="http://schemas.microsoft.com/office/powerpoint/2010/main" Requires="p14">
+      <p:transition p14:dur="250">
+        <p:fade/>
+      </p:transition>
+    </mc:Choice>
+    <mc:Fallback>
+      <p:transition>
+        <p:fade/>
+      </p:transition>
+    </mc:Fallback>
+  </mc:AlternateContent>
 </p:sld>
 </file>
 
@@ -14577,9 +14726,18 @@
   <p:clrMapOvr>
     <a:masterClrMapping/>
   </p:clrMapOvr>
-  <p:transition>
-    <p:fade/>
-  </p:transition>
+  <mc:AlternateContent xmlns:mc="http://schemas.openxmlformats.org/markup-compatibility/2006">
+    <mc:Choice xmlns:p14="http://schemas.microsoft.com/office/powerpoint/2010/main" Requires="p14">
+      <p:transition p14:dur="250">
+        <p:fade/>
+      </p:transition>
+    </mc:Choice>
+    <mc:Fallback>
+      <p:transition>
+        <p:fade/>
+      </p:transition>
+    </mc:Fallback>
+  </mc:AlternateContent>
 </p:sld>
 </file>
 
@@ -15158,9 +15316,18 @@
   <p:clrMapOvr>
     <a:masterClrMapping/>
   </p:clrMapOvr>
-  <p:transition>
-    <p:fade/>
-  </p:transition>
+  <mc:AlternateContent xmlns:mc="http://schemas.openxmlformats.org/markup-compatibility/2006">
+    <mc:Choice xmlns:p14="http://schemas.microsoft.com/office/powerpoint/2010/main" Requires="p14">
+      <p:transition p14:dur="250">
+        <p:fade/>
+      </p:transition>
+    </mc:Choice>
+    <mc:Fallback>
+      <p:transition>
+        <p:fade/>
+      </p:transition>
+    </mc:Fallback>
+  </mc:AlternateContent>
 </p:sld>
 </file>
 
@@ -15695,9 +15862,18 @@
   <p:clrMapOvr>
     <a:masterClrMapping/>
   </p:clrMapOvr>
-  <p:transition>
-    <p:fade/>
-  </p:transition>
+  <mc:AlternateContent xmlns:mc="http://schemas.openxmlformats.org/markup-compatibility/2006">
+    <mc:Choice xmlns:p14="http://schemas.microsoft.com/office/powerpoint/2010/main" Requires="p14">
+      <p:transition p14:dur="250">
+        <p:fade/>
+      </p:transition>
+    </mc:Choice>
+    <mc:Fallback>
+      <p:transition>
+        <p:fade/>
+      </p:transition>
+    </mc:Fallback>
+  </mc:AlternateContent>
 </p:sld>
 </file>
 
@@ -17036,9 +17212,18 @@
   <p:clrMapOvr>
     <a:masterClrMapping/>
   </p:clrMapOvr>
-  <p:transition>
-    <p:fade/>
-  </p:transition>
+  <mc:AlternateContent xmlns:mc="http://schemas.openxmlformats.org/markup-compatibility/2006">
+    <mc:Choice xmlns:p14="http://schemas.microsoft.com/office/powerpoint/2010/main" Requires="p14">
+      <p:transition p14:dur="250">
+        <p:fade/>
+      </p:transition>
+    </mc:Choice>
+    <mc:Fallback>
+      <p:transition>
+        <p:fade/>
+      </p:transition>
+    </mc:Fallback>
+  </mc:AlternateContent>
 </p:sld>
 </file>
 
@@ -18040,9 +18225,18 @@
   <p:clrMapOvr>
     <a:masterClrMapping/>
   </p:clrMapOvr>
-  <p:transition>
-    <p:fade/>
-  </p:transition>
+  <mc:AlternateContent xmlns:mc="http://schemas.openxmlformats.org/markup-compatibility/2006">
+    <mc:Choice xmlns:p14="http://schemas.microsoft.com/office/powerpoint/2010/main" Requires="p14">
+      <p:transition p14:dur="250">
+        <p:fade/>
+      </p:transition>
+    </mc:Choice>
+    <mc:Fallback>
+      <p:transition>
+        <p:fade/>
+      </p:transition>
+    </mc:Fallback>
+  </mc:AlternateContent>
 </p:sld>
 </file>
 
@@ -19064,9 +19258,18 @@
   <p:clrMapOvr>
     <a:masterClrMapping/>
   </p:clrMapOvr>
-  <p:transition>
-    <p:fade/>
-  </p:transition>
+  <mc:AlternateContent xmlns:mc="http://schemas.openxmlformats.org/markup-compatibility/2006">
+    <mc:Choice xmlns:p14="http://schemas.microsoft.com/office/powerpoint/2010/main" Requires="p14">
+      <p:transition p14:dur="250">
+        <p:fade/>
+      </p:transition>
+    </mc:Choice>
+    <mc:Fallback>
+      <p:transition>
+        <p:fade/>
+      </p:transition>
+    </mc:Fallback>
+  </mc:AlternateContent>
 </p:sld>
 </file>
 
@@ -20136,9 +20339,18 @@
   <p:clrMapOvr>
     <a:masterClrMapping/>
   </p:clrMapOvr>
-  <p:transition>
-    <p:fade/>
-  </p:transition>
+  <mc:AlternateContent xmlns:mc="http://schemas.openxmlformats.org/markup-compatibility/2006">
+    <mc:Choice xmlns:p14="http://schemas.microsoft.com/office/powerpoint/2010/main" Requires="p14">
+      <p:transition p14:dur="250">
+        <p:fade/>
+      </p:transition>
+    </mc:Choice>
+    <mc:Fallback>
+      <p:transition>
+        <p:fade/>
+      </p:transition>
+    </mc:Fallback>
+  </mc:AlternateContent>
 </p:sld>
 </file>
 
@@ -20929,9 +21141,18 @@
   <p:clrMapOvr>
     <a:masterClrMapping/>
   </p:clrMapOvr>
-  <p:transition>
-    <p:fade/>
-  </p:transition>
+  <mc:AlternateContent xmlns:mc="http://schemas.openxmlformats.org/markup-compatibility/2006">
+    <mc:Choice xmlns:p14="http://schemas.microsoft.com/office/powerpoint/2010/main" Requires="p14">
+      <p:transition p14:dur="250">
+        <p:fade/>
+      </p:transition>
+    </mc:Choice>
+    <mc:Fallback>
+      <p:transition>
+        <p:fade/>
+      </p:transition>
+    </mc:Fallback>
+  </mc:AlternateContent>
 </p:sld>
 </file>
 
@@ -22082,9 +22303,18 @@
   <p:clrMapOvr>
     <a:masterClrMapping/>
   </p:clrMapOvr>
-  <p:transition>
-    <p:fade/>
-  </p:transition>
+  <mc:AlternateContent xmlns:mc="http://schemas.openxmlformats.org/markup-compatibility/2006">
+    <mc:Choice xmlns:p14="http://schemas.microsoft.com/office/powerpoint/2010/main" Requires="p14">
+      <p:transition p14:dur="250">
+        <p:fade/>
+      </p:transition>
+    </mc:Choice>
+    <mc:Fallback>
+      <p:transition>
+        <p:fade/>
+      </p:transition>
+    </mc:Fallback>
+  </mc:AlternateContent>
 </p:sld>
 </file>
 
@@ -23058,9 +23288,18 @@
   <p:clrMapOvr>
     <a:masterClrMapping/>
   </p:clrMapOvr>
-  <p:transition>
-    <p:fade/>
-  </p:transition>
+  <mc:AlternateContent xmlns:mc="http://schemas.openxmlformats.org/markup-compatibility/2006">
+    <mc:Choice xmlns:p14="http://schemas.microsoft.com/office/powerpoint/2010/main" Requires="p14">
+      <p:transition p14:dur="250">
+        <p:fade/>
+      </p:transition>
+    </mc:Choice>
+    <mc:Fallback>
+      <p:transition>
+        <p:fade/>
+      </p:transition>
+    </mc:Fallback>
+  </mc:AlternateContent>
 </p:sld>
 </file>
 
@@ -24086,9 +24325,18 @@
   <p:clrMapOvr>
     <a:masterClrMapping/>
   </p:clrMapOvr>
-  <p:transition>
-    <p:fade/>
-  </p:transition>
+  <mc:AlternateContent xmlns:mc="http://schemas.openxmlformats.org/markup-compatibility/2006">
+    <mc:Choice xmlns:p14="http://schemas.microsoft.com/office/powerpoint/2010/main" Requires="p14">
+      <p:transition p14:dur="250">
+        <p:fade/>
+      </p:transition>
+    </mc:Choice>
+    <mc:Fallback>
+      <p:transition>
+        <p:fade/>
+      </p:transition>
+    </mc:Fallback>
+  </mc:AlternateContent>
 </p:sld>
 </file>
 
@@ -25184,9 +25432,18 @@
   <p:clrMapOvr>
     <a:masterClrMapping/>
   </p:clrMapOvr>
-  <p:transition>
-    <p:fade/>
-  </p:transition>
+  <mc:AlternateContent xmlns:mc="http://schemas.openxmlformats.org/markup-compatibility/2006">
+    <mc:Choice xmlns:p14="http://schemas.microsoft.com/office/powerpoint/2010/main" Requires="p14">
+      <p:transition p14:dur="250">
+        <p:fade/>
+      </p:transition>
+    </mc:Choice>
+    <mc:Fallback>
+      <p:transition>
+        <p:fade/>
+      </p:transition>
+    </mc:Fallback>
+  </mc:AlternateContent>
 </p:sld>
 </file>
 
@@ -26244,9 +26501,18 @@
   <p:clrMapOvr>
     <a:masterClrMapping/>
   </p:clrMapOvr>
-  <p:transition>
-    <p:fade/>
-  </p:transition>
+  <mc:AlternateContent xmlns:mc="http://schemas.openxmlformats.org/markup-compatibility/2006">
+    <mc:Choice xmlns:p14="http://schemas.microsoft.com/office/powerpoint/2010/main" Requires="p14">
+      <p:transition p14:dur="250">
+        <p:fade/>
+      </p:transition>
+    </mc:Choice>
+    <mc:Fallback>
+      <p:transition>
+        <p:fade/>
+      </p:transition>
+    </mc:Fallback>
+  </mc:AlternateContent>
 </p:sld>
 </file>
 
@@ -27277,9 +27543,18 @@
   <p:clrMapOvr>
     <a:masterClrMapping/>
   </p:clrMapOvr>
-  <p:transition>
-    <p:fade/>
-  </p:transition>
+  <mc:AlternateContent xmlns:mc="http://schemas.openxmlformats.org/markup-compatibility/2006">
+    <mc:Choice xmlns:p14="http://schemas.microsoft.com/office/powerpoint/2010/main" Requires="p14">
+      <p:transition p14:dur="250">
+        <p:fade/>
+      </p:transition>
+    </mc:Choice>
+    <mc:Fallback>
+      <p:transition>
+        <p:fade/>
+      </p:transition>
+    </mc:Fallback>
+  </mc:AlternateContent>
 </p:sld>
 </file>
 
@@ -28305,9 +28580,18 @@
   <p:clrMapOvr>
     <a:masterClrMapping/>
   </p:clrMapOvr>
-  <p:transition>
-    <p:fade/>
-  </p:transition>
+  <mc:AlternateContent xmlns:mc="http://schemas.openxmlformats.org/markup-compatibility/2006">
+    <mc:Choice xmlns:p14="http://schemas.microsoft.com/office/powerpoint/2010/main" Requires="p14">
+      <p:transition p14:dur="250">
+        <p:fade/>
+      </p:transition>
+    </mc:Choice>
+    <mc:Fallback>
+      <p:transition>
+        <p:fade/>
+      </p:transition>
+    </mc:Fallback>
+  </mc:AlternateContent>
 </p:sld>
 </file>
 
@@ -29333,9 +29617,18 @@
   <p:clrMapOvr>
     <a:masterClrMapping/>
   </p:clrMapOvr>
-  <p:transition>
-    <p:fade/>
-  </p:transition>
+  <mc:AlternateContent xmlns:mc="http://schemas.openxmlformats.org/markup-compatibility/2006">
+    <mc:Choice xmlns:p14="http://schemas.microsoft.com/office/powerpoint/2010/main" Requires="p14">
+      <p:transition p14:dur="250">
+        <p:fade/>
+      </p:transition>
+    </mc:Choice>
+    <mc:Fallback>
+      <p:transition>
+        <p:fade/>
+      </p:transition>
+    </mc:Fallback>
+  </mc:AlternateContent>
 </p:sld>
 </file>
 
@@ -29577,9 +29870,18 @@
   <p:clrMapOvr>
     <a:masterClrMapping/>
   </p:clrMapOvr>
-  <p:transition>
-    <p:fade/>
-  </p:transition>
+  <mc:AlternateContent xmlns:mc="http://schemas.openxmlformats.org/markup-compatibility/2006">
+    <mc:Choice xmlns:p14="http://schemas.microsoft.com/office/powerpoint/2010/main" Requires="p14">
+      <p:transition p14:dur="250">
+        <p:fade/>
+      </p:transition>
+    </mc:Choice>
+    <mc:Fallback>
+      <p:transition>
+        <p:fade/>
+      </p:transition>
+    </mc:Fallback>
+  </mc:AlternateContent>
 </p:sld>
 </file>
 
@@ -30072,9 +30374,18 @@
   <p:clrMapOvr>
     <a:masterClrMapping/>
   </p:clrMapOvr>
-  <p:transition>
-    <p:fade/>
-  </p:transition>
+  <mc:AlternateContent xmlns:mc="http://schemas.openxmlformats.org/markup-compatibility/2006">
+    <mc:Choice xmlns:p14="http://schemas.microsoft.com/office/powerpoint/2010/main" Requires="p14">
+      <p:transition p14:dur="250">
+        <p:fade/>
+      </p:transition>
+    </mc:Choice>
+    <mc:Fallback>
+      <p:transition>
+        <p:fade/>
+      </p:transition>
+    </mc:Fallback>
+  </mc:AlternateContent>
 </p:sld>
 </file>
 
@@ -30407,9 +30718,18 @@
   <p:clrMapOvr>
     <a:masterClrMapping/>
   </p:clrMapOvr>
-  <p:transition>
-    <p:fade/>
-  </p:transition>
+  <mc:AlternateContent xmlns:mc="http://schemas.openxmlformats.org/markup-compatibility/2006">
+    <mc:Choice xmlns:p14="http://schemas.microsoft.com/office/powerpoint/2010/main" Requires="p14">
+      <p:transition p14:dur="250">
+        <p:fade/>
+      </p:transition>
+    </mc:Choice>
+    <mc:Fallback>
+      <p:transition>
+        <p:fade/>
+      </p:transition>
+    </mc:Fallback>
+  </mc:AlternateContent>
 </p:sld>
 </file>
 
@@ -30766,9 +31086,18 @@
   <p:clrMapOvr>
     <a:masterClrMapping/>
   </p:clrMapOvr>
-  <p:transition>
-    <p:fade/>
-  </p:transition>
+  <mc:AlternateContent xmlns:mc="http://schemas.openxmlformats.org/markup-compatibility/2006">
+    <mc:Choice xmlns:p14="http://schemas.microsoft.com/office/powerpoint/2010/main" Requires="p14">
+      <p:transition p14:dur="250">
+        <p:fade/>
+      </p:transition>
+    </mc:Choice>
+    <mc:Fallback>
+      <p:transition>
+        <p:fade/>
+      </p:transition>
+    </mc:Fallback>
+  </mc:AlternateContent>
 </p:sld>
 </file>
 
@@ -32180,9 +32509,18 @@
   <p:clrMapOvr>
     <a:masterClrMapping/>
   </p:clrMapOvr>
-  <p:transition>
-    <p:fade/>
-  </p:transition>
+  <mc:AlternateContent xmlns:mc="http://schemas.openxmlformats.org/markup-compatibility/2006">
+    <mc:Choice xmlns:p14="http://schemas.microsoft.com/office/powerpoint/2010/main" Requires="p14">
+      <p:transition p14:dur="250">
+        <p:fade/>
+      </p:transition>
+    </mc:Choice>
+    <mc:Fallback>
+      <p:transition>
+        <p:fade/>
+      </p:transition>
+    </mc:Fallback>
+  </mc:AlternateContent>
 </p:sld>
 </file>
 
@@ -35033,9 +35371,18 @@
   <p:clrMapOvr>
     <a:masterClrMapping/>
   </p:clrMapOvr>
-  <p:transition>
-    <p:fade/>
-  </p:transition>
+  <mc:AlternateContent xmlns:mc="http://schemas.openxmlformats.org/markup-compatibility/2006">
+    <mc:Choice xmlns:p14="http://schemas.microsoft.com/office/powerpoint/2010/main" Requires="p14">
+      <p:transition p14:dur="250">
+        <p:fade/>
+      </p:transition>
+    </mc:Choice>
+    <mc:Fallback>
+      <p:transition>
+        <p:fade/>
+      </p:transition>
+    </mc:Fallback>
+  </mc:AlternateContent>
 </p:sld>
 </file>
 
@@ -35562,9 +35909,18 @@
   <p:clrMapOvr>
     <a:masterClrMapping/>
   </p:clrMapOvr>
-  <p:transition>
-    <p:fade/>
-  </p:transition>
+  <mc:AlternateContent xmlns:mc="http://schemas.openxmlformats.org/markup-compatibility/2006">
+    <mc:Choice xmlns:p14="http://schemas.microsoft.com/office/powerpoint/2010/main" Requires="p14">
+      <p:transition p14:dur="250">
+        <p:fade/>
+      </p:transition>
+    </mc:Choice>
+    <mc:Fallback>
+      <p:transition>
+        <p:fade/>
+      </p:transition>
+    </mc:Fallback>
+  </mc:AlternateContent>
 </p:sld>
 </file>
 
@@ -35957,9 +36313,18 @@
   <p:clrMapOvr>
     <a:masterClrMapping/>
   </p:clrMapOvr>
-  <p:transition>
-    <p:fade/>
-  </p:transition>
+  <mc:AlternateContent xmlns:mc="http://schemas.openxmlformats.org/markup-compatibility/2006">
+    <mc:Choice xmlns:p14="http://schemas.microsoft.com/office/powerpoint/2010/main" Requires="p14">
+      <p:transition p14:dur="250">
+        <p:fade/>
+      </p:transition>
+    </mc:Choice>
+    <mc:Fallback>
+      <p:transition>
+        <p:fade/>
+      </p:transition>
+    </mc:Fallback>
+  </mc:AlternateContent>
 </p:sld>
 </file>
 
@@ -36490,9 +36855,18 @@
   <p:clrMapOvr>
     <a:masterClrMapping/>
   </p:clrMapOvr>
-  <p:transition>
-    <p:fade/>
-  </p:transition>
+  <mc:AlternateContent xmlns:mc="http://schemas.openxmlformats.org/markup-compatibility/2006">
+    <mc:Choice xmlns:p14="http://schemas.microsoft.com/office/powerpoint/2010/main" Requires="p14">
+      <p:transition p14:dur="250">
+        <p:fade/>
+      </p:transition>
+    </mc:Choice>
+    <mc:Fallback>
+      <p:transition>
+        <p:fade/>
+      </p:transition>
+    </mc:Fallback>
+  </mc:AlternateContent>
 </p:sld>
 </file>
 
@@ -39050,9 +39424,18 @@
   <p:clrMapOvr>
     <a:masterClrMapping/>
   </p:clrMapOvr>
-  <p:transition>
-    <p:fade/>
-  </p:transition>
+  <mc:AlternateContent xmlns:mc="http://schemas.openxmlformats.org/markup-compatibility/2006">
+    <mc:Choice xmlns:p14="http://schemas.microsoft.com/office/powerpoint/2010/main" Requires="p14">
+      <p:transition p14:dur="250">
+        <p:fade/>
+      </p:transition>
+    </mc:Choice>
+    <mc:Fallback>
+      <p:transition>
+        <p:fade/>
+      </p:transition>
+    </mc:Fallback>
+  </mc:AlternateContent>
 </p:sld>
 </file>
 
@@ -39373,9 +39756,18 @@
   <p:clrMapOvr>
     <a:masterClrMapping/>
   </p:clrMapOvr>
-  <p:transition>
-    <p:fade/>
-  </p:transition>
+  <mc:AlternateContent xmlns:mc="http://schemas.openxmlformats.org/markup-compatibility/2006">
+    <mc:Choice xmlns:p14="http://schemas.microsoft.com/office/powerpoint/2010/main" Requires="p14">
+      <p:transition p14:dur="250">
+        <p:fade/>
+      </p:transition>
+    </mc:Choice>
+    <mc:Fallback>
+      <p:transition>
+        <p:fade/>
+      </p:transition>
+    </mc:Fallback>
+  </mc:AlternateContent>
 </p:sld>
 </file>
 
@@ -39607,9 +39999,18 @@
   <p:clrMapOvr>
     <a:masterClrMapping/>
   </p:clrMapOvr>
-  <p:transition>
-    <p:fade/>
-  </p:transition>
+  <mc:AlternateContent xmlns:mc="http://schemas.openxmlformats.org/markup-compatibility/2006">
+    <mc:Choice xmlns:p14="http://schemas.microsoft.com/office/powerpoint/2010/main" Requires="p14">
+      <p:transition p14:dur="250">
+        <p:fade/>
+      </p:transition>
+    </mc:Choice>
+    <mc:Fallback>
+      <p:transition>
+        <p:fade/>
+      </p:transition>
+    </mc:Fallback>
+  </mc:AlternateContent>
 </p:sld>
 </file>
 
@@ -40101,9 +40502,18 @@
   <p:clrMapOvr>
     <a:masterClrMapping/>
   </p:clrMapOvr>
-  <p:transition>
-    <p:fade/>
-  </p:transition>
+  <mc:AlternateContent xmlns:mc="http://schemas.openxmlformats.org/markup-compatibility/2006">
+    <mc:Choice xmlns:p14="http://schemas.microsoft.com/office/powerpoint/2010/main" Requires="p14">
+      <p:transition p14:dur="250">
+        <p:fade/>
+      </p:transition>
+    </mc:Choice>
+    <mc:Fallback>
+      <p:transition>
+        <p:fade/>
+      </p:transition>
+    </mc:Fallback>
+  </mc:AlternateContent>
 </p:sld>
 </file>
 
@@ -40585,9 +40995,18 @@
   <p:clrMapOvr>
     <a:masterClrMapping/>
   </p:clrMapOvr>
-  <p:transition>
-    <p:fade/>
-  </p:transition>
+  <mc:AlternateContent xmlns:mc="http://schemas.openxmlformats.org/markup-compatibility/2006">
+    <mc:Choice xmlns:p14="http://schemas.microsoft.com/office/powerpoint/2010/main" Requires="p14">
+      <p:transition p14:dur="250">
+        <p:fade/>
+      </p:transition>
+    </mc:Choice>
+    <mc:Fallback>
+      <p:transition>
+        <p:fade/>
+      </p:transition>
+    </mc:Fallback>
+  </mc:AlternateContent>
 </p:sld>
 </file>
 
@@ -44448,9 +44867,18 @@
   <p:clrMapOvr>
     <a:masterClrMapping/>
   </p:clrMapOvr>
-  <p:transition>
-    <p:fade/>
-  </p:transition>
+  <mc:AlternateContent xmlns:mc="http://schemas.openxmlformats.org/markup-compatibility/2006">
+    <mc:Choice xmlns:p14="http://schemas.microsoft.com/office/powerpoint/2010/main" Requires="p14">
+      <p:transition p14:dur="250">
+        <p:fade/>
+      </p:transition>
+    </mc:Choice>
+    <mc:Fallback>
+      <p:transition>
+        <p:fade/>
+      </p:transition>
+    </mc:Fallback>
+  </mc:AlternateContent>
 </p:sld>
 </file>
 
@@ -44995,9 +45423,18 @@
   <p:clrMapOvr>
     <a:masterClrMapping/>
   </p:clrMapOvr>
-  <p:transition>
-    <p:fade/>
-  </p:transition>
+  <mc:AlternateContent xmlns:mc="http://schemas.openxmlformats.org/markup-compatibility/2006">
+    <mc:Choice xmlns:p14="http://schemas.microsoft.com/office/powerpoint/2010/main" Requires="p14">
+      <p:transition p14:dur="250">
+        <p:fade/>
+      </p:transition>
+    </mc:Choice>
+    <mc:Fallback>
+      <p:transition>
+        <p:fade/>
+      </p:transition>
+    </mc:Fallback>
+  </mc:AlternateContent>
 </p:sld>
 </file>
 

</xml_diff>

<commit_message>
revise: final seminar presentation slides
</commit_message>
<xml_diff>
--- a/docs/FinalSeminarPresentation.pptx
+++ b/docs/FinalSeminarPresentation.pptx
@@ -4141,7 +4141,7 @@
           <a:p>
             <a:fld id="{6D6A8138-D4C2-A24A-80FA-6A1EE5914956}" type="datetimeFigureOut">
               <a:rPr lang="en-US" smtClean="0"/>
-              <a:t>12/3/20</a:t>
+              <a:t>12/13/20</a:t>
             </a:fld>
             <a:endParaRPr lang="en-US"/>
           </a:p>
@@ -4318,7 +4318,7 @@
           <a:p>
             <a:fld id="{435793A2-C00B-48F1-8F7C-3BE850BB26D7}" type="datetimeFigureOut">
               <a:rPr lang="en-US" smtClean="0"/>
-              <a:t>12/3/20</a:t>
+              <a:t>12/13/20</a:t>
             </a:fld>
             <a:endParaRPr lang="en-US"/>
           </a:p>
@@ -8296,13 +8296,13 @@
   <p:clrMapOvr>
     <a:masterClrMapping/>
   </p:clrMapOvr>
-  <mc:AlternateContent xmlns:mc="http://schemas.openxmlformats.org/markup-compatibility/2006">
-    <mc:Choice xmlns:p14="http://schemas.microsoft.com/office/powerpoint/2010/main" Requires="p14">
+  <mc:AlternateContent xmlns:mc="http://schemas.openxmlformats.org/markup-compatibility/2006" xmlns:p14="http://schemas.microsoft.com/office/powerpoint/2010/main">
+    <mc:Choice Requires="p14">
       <p:transition p14:dur="250">
         <p:fade/>
       </p:transition>
     </mc:Choice>
-    <mc:Fallback>
+    <mc:Fallback xmlns="">
       <p:transition>
         <p:fade/>
       </p:transition>
@@ -8483,13 +8483,13 @@
   <p:clrMapOvr>
     <a:masterClrMapping/>
   </p:clrMapOvr>
-  <mc:AlternateContent xmlns:mc="http://schemas.openxmlformats.org/markup-compatibility/2006">
-    <mc:Choice xmlns:p14="http://schemas.microsoft.com/office/powerpoint/2010/main" Requires="p14">
+  <mc:AlternateContent xmlns:mc="http://schemas.openxmlformats.org/markup-compatibility/2006" xmlns:p14="http://schemas.microsoft.com/office/powerpoint/2010/main">
+    <mc:Choice Requires="p14">
       <p:transition p14:dur="250">
         <p:fade/>
       </p:transition>
     </mc:Choice>
-    <mc:Fallback>
+    <mc:Fallback xmlns="">
       <p:transition>
         <p:fade/>
       </p:transition>
@@ -8680,13 +8680,13 @@
   <p:clrMapOvr>
     <a:masterClrMapping/>
   </p:clrMapOvr>
-  <mc:AlternateContent xmlns:mc="http://schemas.openxmlformats.org/markup-compatibility/2006">
-    <mc:Choice xmlns:p14="http://schemas.microsoft.com/office/powerpoint/2010/main" Requires="p14">
+  <mc:AlternateContent xmlns:mc="http://schemas.openxmlformats.org/markup-compatibility/2006" xmlns:p14="http://schemas.microsoft.com/office/powerpoint/2010/main">
+    <mc:Choice Requires="p14">
       <p:transition p14:dur="250">
         <p:fade/>
       </p:transition>
     </mc:Choice>
-    <mc:Fallback>
+    <mc:Fallback xmlns="">
       <p:transition>
         <p:fade/>
       </p:transition>
@@ -8823,13 +8823,13 @@
   <p:clrMapOvr>
     <a:masterClrMapping/>
   </p:clrMapOvr>
-  <mc:AlternateContent xmlns:mc="http://schemas.openxmlformats.org/markup-compatibility/2006">
-    <mc:Choice xmlns:p14="http://schemas.microsoft.com/office/powerpoint/2010/main" Requires="p14">
+  <mc:AlternateContent xmlns:mc="http://schemas.openxmlformats.org/markup-compatibility/2006" xmlns:p14="http://schemas.microsoft.com/office/powerpoint/2010/main">
+    <mc:Choice Requires="p14">
       <p:transition p14:dur="250">
         <p:fade/>
       </p:transition>
     </mc:Choice>
-    <mc:Fallback>
+    <mc:Fallback xmlns="">
       <p:transition>
         <p:fade/>
       </p:transition>
@@ -9010,13 +9010,13 @@
   <p:clrMapOvr>
     <a:masterClrMapping/>
   </p:clrMapOvr>
-  <mc:AlternateContent xmlns:mc="http://schemas.openxmlformats.org/markup-compatibility/2006">
-    <mc:Choice xmlns:p14="http://schemas.microsoft.com/office/powerpoint/2010/main" Requires="p14">
+  <mc:AlternateContent xmlns:mc="http://schemas.openxmlformats.org/markup-compatibility/2006" xmlns:p14="http://schemas.microsoft.com/office/powerpoint/2010/main">
+    <mc:Choice Requires="p14">
       <p:transition p14:dur="250">
         <p:fade/>
       </p:transition>
     </mc:Choice>
-    <mc:Fallback>
+    <mc:Fallback xmlns="">
       <p:transition>
         <p:fade/>
       </p:transition>
@@ -9275,13 +9275,13 @@
   <p:clrMapOvr>
     <a:masterClrMapping/>
   </p:clrMapOvr>
-  <mc:AlternateContent xmlns:mc="http://schemas.openxmlformats.org/markup-compatibility/2006">
-    <mc:Choice xmlns:p14="http://schemas.microsoft.com/office/powerpoint/2010/main" Requires="p14">
+  <mc:AlternateContent xmlns:mc="http://schemas.openxmlformats.org/markup-compatibility/2006" xmlns:p14="http://schemas.microsoft.com/office/powerpoint/2010/main">
+    <mc:Choice Requires="p14">
       <p:transition p14:dur="250">
         <p:fade/>
       </p:transition>
     </mc:Choice>
-    <mc:Fallback>
+    <mc:Fallback xmlns="">
       <p:transition>
         <p:fade/>
       </p:transition>
@@ -9579,13 +9579,13 @@
   <p:clrMapOvr>
     <a:masterClrMapping/>
   </p:clrMapOvr>
-  <mc:AlternateContent xmlns:mc="http://schemas.openxmlformats.org/markup-compatibility/2006">
-    <mc:Choice xmlns:p14="http://schemas.microsoft.com/office/powerpoint/2010/main" Requires="p14">
+  <mc:AlternateContent xmlns:mc="http://schemas.openxmlformats.org/markup-compatibility/2006" xmlns:p14="http://schemas.microsoft.com/office/powerpoint/2010/main">
+    <mc:Choice Requires="p14">
       <p:transition p14:dur="250">
         <p:fade/>
       </p:transition>
     </mc:Choice>
-    <mc:Fallback>
+    <mc:Fallback xmlns="">
       <p:transition>
         <p:fade/>
       </p:transition>
@@ -10018,13 +10018,13 @@
   <p:clrMapOvr>
     <a:masterClrMapping/>
   </p:clrMapOvr>
-  <mc:AlternateContent xmlns:mc="http://schemas.openxmlformats.org/markup-compatibility/2006">
-    <mc:Choice xmlns:p14="http://schemas.microsoft.com/office/powerpoint/2010/main" Requires="p14">
+  <mc:AlternateContent xmlns:mc="http://schemas.openxmlformats.org/markup-compatibility/2006" xmlns:p14="http://schemas.microsoft.com/office/powerpoint/2010/main">
+    <mc:Choice Requires="p14">
       <p:transition p14:dur="250">
         <p:fade/>
       </p:transition>
     </mc:Choice>
-    <mc:Fallback>
+    <mc:Fallback xmlns="">
       <p:transition>
         <p:fade/>
       </p:transition>
@@ -10154,13 +10154,13 @@
   <p:clrMapOvr>
     <a:masterClrMapping/>
   </p:clrMapOvr>
-  <mc:AlternateContent xmlns:mc="http://schemas.openxmlformats.org/markup-compatibility/2006">
-    <mc:Choice xmlns:p14="http://schemas.microsoft.com/office/powerpoint/2010/main" Requires="p14">
+  <mc:AlternateContent xmlns:mc="http://schemas.openxmlformats.org/markup-compatibility/2006" xmlns:p14="http://schemas.microsoft.com/office/powerpoint/2010/main">
+    <mc:Choice Requires="p14">
       <p:transition p14:dur="250">
         <p:fade/>
       </p:transition>
     </mc:Choice>
-    <mc:Fallback>
+    <mc:Fallback xmlns="">
       <p:transition>
         <p:fade/>
       </p:transition>
@@ -10268,13 +10268,13 @@
   <p:clrMapOvr>
     <a:masterClrMapping/>
   </p:clrMapOvr>
-  <mc:AlternateContent xmlns:mc="http://schemas.openxmlformats.org/markup-compatibility/2006">
-    <mc:Choice xmlns:p14="http://schemas.microsoft.com/office/powerpoint/2010/main" Requires="p14">
+  <mc:AlternateContent xmlns:mc="http://schemas.openxmlformats.org/markup-compatibility/2006" xmlns:p14="http://schemas.microsoft.com/office/powerpoint/2010/main">
+    <mc:Choice Requires="p14">
       <p:transition p14:dur="250">
         <p:fade/>
       </p:transition>
     </mc:Choice>
-    <mc:Fallback>
+    <mc:Fallback xmlns="">
       <p:transition>
         <p:fade/>
       </p:transition>
@@ -10562,13 +10562,13 @@
   <p:clrMapOvr>
     <a:masterClrMapping/>
   </p:clrMapOvr>
-  <mc:AlternateContent xmlns:mc="http://schemas.openxmlformats.org/markup-compatibility/2006">
-    <mc:Choice xmlns:p14="http://schemas.microsoft.com/office/powerpoint/2010/main" Requires="p14">
+  <mc:AlternateContent xmlns:mc="http://schemas.openxmlformats.org/markup-compatibility/2006" xmlns:p14="http://schemas.microsoft.com/office/powerpoint/2010/main">
+    <mc:Choice Requires="p14">
       <p:transition p14:dur="250">
         <p:fade/>
       </p:transition>
     </mc:Choice>
-    <mc:Fallback>
+    <mc:Fallback xmlns="">
       <p:transition>
         <p:fade/>
       </p:transition>
@@ -10836,13 +10836,13 @@
   <p:clrMapOvr>
     <a:masterClrMapping/>
   </p:clrMapOvr>
-  <mc:AlternateContent xmlns:mc="http://schemas.openxmlformats.org/markup-compatibility/2006">
-    <mc:Choice xmlns:p14="http://schemas.microsoft.com/office/powerpoint/2010/main" Requires="p14">
+  <mc:AlternateContent xmlns:mc="http://schemas.openxmlformats.org/markup-compatibility/2006" xmlns:p14="http://schemas.microsoft.com/office/powerpoint/2010/main">
+    <mc:Choice Requires="p14">
       <p:transition p14:dur="250">
         <p:fade/>
       </p:transition>
     </mc:Choice>
-    <mc:Fallback>
+    <mc:Fallback xmlns="">
       <p:transition>
         <p:fade/>
       </p:transition>
@@ -11212,13 +11212,13 @@
     <p:sldLayoutId id="2147483659" r:id="rId11"/>
     <p:sldLayoutId id="2147483660" r:id="rId12"/>
   </p:sldLayoutIdLst>
-  <mc:AlternateContent xmlns:mc="http://schemas.openxmlformats.org/markup-compatibility/2006">
-    <mc:Choice xmlns:p14="http://schemas.microsoft.com/office/powerpoint/2010/main" Requires="p14">
+  <mc:AlternateContent xmlns:mc="http://schemas.openxmlformats.org/markup-compatibility/2006" xmlns:p14="http://schemas.microsoft.com/office/powerpoint/2010/main">
+    <mc:Choice Requires="p14">
       <p:transition p14:dur="250">
         <p:fade/>
       </p:transition>
     </mc:Choice>
-    <mc:Fallback>
+    <mc:Fallback xmlns="">
       <p:transition>
         <p:fade/>
       </p:transition>
@@ -12179,11 +12179,11 @@
   <p:clrMapOvr>
     <a:masterClrMapping/>
   </p:clrMapOvr>
-  <mc:AlternateContent xmlns:mc="http://schemas.openxmlformats.org/markup-compatibility/2006">
-    <mc:Choice xmlns:p14="http://schemas.microsoft.com/office/powerpoint/2010/main" Requires="p14">
+  <mc:AlternateContent xmlns:mc="http://schemas.openxmlformats.org/markup-compatibility/2006" xmlns:p14="http://schemas.microsoft.com/office/powerpoint/2010/main">
+    <mc:Choice Requires="p14">
       <p:transition p14:dur="0"/>
     </mc:Choice>
-    <mc:Fallback>
+    <mc:Fallback xmlns="">
       <p:transition/>
     </mc:Fallback>
   </mc:AlternateContent>
@@ -12670,13 +12670,13 @@
   <p:clrMapOvr>
     <a:masterClrMapping/>
   </p:clrMapOvr>
-  <mc:AlternateContent xmlns:mc="http://schemas.openxmlformats.org/markup-compatibility/2006">
-    <mc:Choice xmlns:p14="http://schemas.microsoft.com/office/powerpoint/2010/main" Requires="p14">
+  <mc:AlternateContent xmlns:mc="http://schemas.openxmlformats.org/markup-compatibility/2006" xmlns:p14="http://schemas.microsoft.com/office/powerpoint/2010/main">
+    <mc:Choice Requires="p14">
       <p:transition p14:dur="250">
         <p:fade/>
       </p:transition>
     </mc:Choice>
-    <mc:Fallback>
+    <mc:Fallback xmlns="">
       <p:transition>
         <p:fade/>
       </p:transition>
@@ -13535,13 +13535,13 @@
   <p:clrMapOvr>
     <a:masterClrMapping/>
   </p:clrMapOvr>
-  <mc:AlternateContent xmlns:mc="http://schemas.openxmlformats.org/markup-compatibility/2006">
-    <mc:Choice xmlns:p14="http://schemas.microsoft.com/office/powerpoint/2010/main" Requires="p14">
+  <mc:AlternateContent xmlns:mc="http://schemas.openxmlformats.org/markup-compatibility/2006" xmlns:p14="http://schemas.microsoft.com/office/powerpoint/2010/main">
+    <mc:Choice Requires="p14">
       <p:transition p14:dur="250">
         <p:fade/>
       </p:transition>
     </mc:Choice>
-    <mc:Fallback>
+    <mc:Fallback xmlns="">
       <p:transition>
         <p:fade/>
       </p:transition>
@@ -14037,13 +14037,13 @@
   <p:clrMapOvr>
     <a:masterClrMapping/>
   </p:clrMapOvr>
-  <mc:AlternateContent xmlns:mc="http://schemas.openxmlformats.org/markup-compatibility/2006">
-    <mc:Choice xmlns:p14="http://schemas.microsoft.com/office/powerpoint/2010/main" Requires="p14">
+  <mc:AlternateContent xmlns:mc="http://schemas.openxmlformats.org/markup-compatibility/2006" xmlns:p14="http://schemas.microsoft.com/office/powerpoint/2010/main">
+    <mc:Choice Requires="p14">
       <p:transition p14:dur="250">
         <p:fade/>
       </p:transition>
     </mc:Choice>
-    <mc:Fallback>
+    <mc:Fallback xmlns="">
       <p:transition>
         <p:fade/>
       </p:transition>
@@ -14726,13 +14726,13 @@
   <p:clrMapOvr>
     <a:masterClrMapping/>
   </p:clrMapOvr>
-  <mc:AlternateContent xmlns:mc="http://schemas.openxmlformats.org/markup-compatibility/2006">
-    <mc:Choice xmlns:p14="http://schemas.microsoft.com/office/powerpoint/2010/main" Requires="p14">
+  <mc:AlternateContent xmlns:mc="http://schemas.openxmlformats.org/markup-compatibility/2006" xmlns:p14="http://schemas.microsoft.com/office/powerpoint/2010/main">
+    <mc:Choice Requires="p14">
       <p:transition p14:dur="250">
         <p:fade/>
       </p:transition>
     </mc:Choice>
-    <mc:Fallback>
+    <mc:Fallback xmlns="">
       <p:transition>
         <p:fade/>
       </p:transition>
@@ -15316,13 +15316,13 @@
   <p:clrMapOvr>
     <a:masterClrMapping/>
   </p:clrMapOvr>
-  <mc:AlternateContent xmlns:mc="http://schemas.openxmlformats.org/markup-compatibility/2006">
-    <mc:Choice xmlns:p14="http://schemas.microsoft.com/office/powerpoint/2010/main" Requires="p14">
+  <mc:AlternateContent xmlns:mc="http://schemas.openxmlformats.org/markup-compatibility/2006" xmlns:p14="http://schemas.microsoft.com/office/powerpoint/2010/main">
+    <mc:Choice Requires="p14">
       <p:transition p14:dur="250">
         <p:fade/>
       </p:transition>
     </mc:Choice>
-    <mc:Fallback>
+    <mc:Fallback xmlns="">
       <p:transition>
         <p:fade/>
       </p:transition>
@@ -15862,13 +15862,13 @@
   <p:clrMapOvr>
     <a:masterClrMapping/>
   </p:clrMapOvr>
-  <mc:AlternateContent xmlns:mc="http://schemas.openxmlformats.org/markup-compatibility/2006">
-    <mc:Choice xmlns:p14="http://schemas.microsoft.com/office/powerpoint/2010/main" Requires="p14">
+  <mc:AlternateContent xmlns:mc="http://schemas.openxmlformats.org/markup-compatibility/2006" xmlns:p14="http://schemas.microsoft.com/office/powerpoint/2010/main">
+    <mc:Choice Requires="p14">
       <p:transition p14:dur="250">
         <p:fade/>
       </p:transition>
     </mc:Choice>
-    <mc:Fallback>
+    <mc:Fallback xmlns="">
       <p:transition>
         <p:fade/>
       </p:transition>
@@ -17212,13 +17212,13 @@
   <p:clrMapOvr>
     <a:masterClrMapping/>
   </p:clrMapOvr>
-  <mc:AlternateContent xmlns:mc="http://schemas.openxmlformats.org/markup-compatibility/2006">
-    <mc:Choice xmlns:p14="http://schemas.microsoft.com/office/powerpoint/2010/main" Requires="p14">
+  <mc:AlternateContent xmlns:mc="http://schemas.openxmlformats.org/markup-compatibility/2006" xmlns:p14="http://schemas.microsoft.com/office/powerpoint/2010/main">
+    <mc:Choice Requires="p14">
       <p:transition p14:dur="250">
         <p:fade/>
       </p:transition>
     </mc:Choice>
-    <mc:Fallback>
+    <mc:Fallback xmlns="">
       <p:transition>
         <p:fade/>
       </p:transition>
@@ -18225,13 +18225,13 @@
   <p:clrMapOvr>
     <a:masterClrMapping/>
   </p:clrMapOvr>
-  <mc:AlternateContent xmlns:mc="http://schemas.openxmlformats.org/markup-compatibility/2006">
-    <mc:Choice xmlns:p14="http://schemas.microsoft.com/office/powerpoint/2010/main" Requires="p14">
+  <mc:AlternateContent xmlns:mc="http://schemas.openxmlformats.org/markup-compatibility/2006" xmlns:p14="http://schemas.microsoft.com/office/powerpoint/2010/main">
+    <mc:Choice Requires="p14">
       <p:transition p14:dur="250">
         <p:fade/>
       </p:transition>
     </mc:Choice>
-    <mc:Fallback>
+    <mc:Fallback xmlns="">
       <p:transition>
         <p:fade/>
       </p:transition>
@@ -19258,13 +19258,13 @@
   <p:clrMapOvr>
     <a:masterClrMapping/>
   </p:clrMapOvr>
-  <mc:AlternateContent xmlns:mc="http://schemas.openxmlformats.org/markup-compatibility/2006">
-    <mc:Choice xmlns:p14="http://schemas.microsoft.com/office/powerpoint/2010/main" Requires="p14">
+  <mc:AlternateContent xmlns:mc="http://schemas.openxmlformats.org/markup-compatibility/2006" xmlns:p14="http://schemas.microsoft.com/office/powerpoint/2010/main">
+    <mc:Choice Requires="p14">
       <p:transition p14:dur="250">
         <p:fade/>
       </p:transition>
     </mc:Choice>
-    <mc:Fallback>
+    <mc:Fallback xmlns="">
       <p:transition>
         <p:fade/>
       </p:transition>
@@ -20339,13 +20339,13 @@
   <p:clrMapOvr>
     <a:masterClrMapping/>
   </p:clrMapOvr>
-  <mc:AlternateContent xmlns:mc="http://schemas.openxmlformats.org/markup-compatibility/2006">
-    <mc:Choice xmlns:p14="http://schemas.microsoft.com/office/powerpoint/2010/main" Requires="p14">
+  <mc:AlternateContent xmlns:mc="http://schemas.openxmlformats.org/markup-compatibility/2006" xmlns:p14="http://schemas.microsoft.com/office/powerpoint/2010/main">
+    <mc:Choice Requires="p14">
       <p:transition p14:dur="250">
         <p:fade/>
       </p:transition>
     </mc:Choice>
-    <mc:Fallback>
+    <mc:Fallback xmlns="">
       <p:transition>
         <p:fade/>
       </p:transition>
@@ -21141,13 +21141,13 @@
   <p:clrMapOvr>
     <a:masterClrMapping/>
   </p:clrMapOvr>
-  <mc:AlternateContent xmlns:mc="http://schemas.openxmlformats.org/markup-compatibility/2006">
-    <mc:Choice xmlns:p14="http://schemas.microsoft.com/office/powerpoint/2010/main" Requires="p14">
+  <mc:AlternateContent xmlns:mc="http://schemas.openxmlformats.org/markup-compatibility/2006" xmlns:p14="http://schemas.microsoft.com/office/powerpoint/2010/main">
+    <mc:Choice Requires="p14">
       <p:transition p14:dur="250">
         <p:fade/>
       </p:transition>
     </mc:Choice>
-    <mc:Fallback>
+    <mc:Fallback xmlns="">
       <p:transition>
         <p:fade/>
       </p:transition>
@@ -22303,13 +22303,13 @@
   <p:clrMapOvr>
     <a:masterClrMapping/>
   </p:clrMapOvr>
-  <mc:AlternateContent xmlns:mc="http://schemas.openxmlformats.org/markup-compatibility/2006">
-    <mc:Choice xmlns:p14="http://schemas.microsoft.com/office/powerpoint/2010/main" Requires="p14">
+  <mc:AlternateContent xmlns:mc="http://schemas.openxmlformats.org/markup-compatibility/2006" xmlns:p14="http://schemas.microsoft.com/office/powerpoint/2010/main">
+    <mc:Choice Requires="p14">
       <p:transition p14:dur="250">
         <p:fade/>
       </p:transition>
     </mc:Choice>
-    <mc:Fallback>
+    <mc:Fallback xmlns="">
       <p:transition>
         <p:fade/>
       </p:transition>
@@ -23288,13 +23288,13 @@
   <p:clrMapOvr>
     <a:masterClrMapping/>
   </p:clrMapOvr>
-  <mc:AlternateContent xmlns:mc="http://schemas.openxmlformats.org/markup-compatibility/2006">
-    <mc:Choice xmlns:p14="http://schemas.microsoft.com/office/powerpoint/2010/main" Requires="p14">
+  <mc:AlternateContent xmlns:mc="http://schemas.openxmlformats.org/markup-compatibility/2006" xmlns:p14="http://schemas.microsoft.com/office/powerpoint/2010/main">
+    <mc:Choice Requires="p14">
       <p:transition p14:dur="250">
         <p:fade/>
       </p:transition>
     </mc:Choice>
-    <mc:Fallback>
+    <mc:Fallback xmlns="">
       <p:transition>
         <p:fade/>
       </p:transition>
@@ -24325,13 +24325,13 @@
   <p:clrMapOvr>
     <a:masterClrMapping/>
   </p:clrMapOvr>
-  <mc:AlternateContent xmlns:mc="http://schemas.openxmlformats.org/markup-compatibility/2006">
-    <mc:Choice xmlns:p14="http://schemas.microsoft.com/office/powerpoint/2010/main" Requires="p14">
+  <mc:AlternateContent xmlns:mc="http://schemas.openxmlformats.org/markup-compatibility/2006" xmlns:p14="http://schemas.microsoft.com/office/powerpoint/2010/main">
+    <mc:Choice Requires="p14">
       <p:transition p14:dur="250">
         <p:fade/>
       </p:transition>
     </mc:Choice>
-    <mc:Fallback>
+    <mc:Fallback xmlns="">
       <p:transition>
         <p:fade/>
       </p:transition>
@@ -24380,7 +24380,7 @@
           <p:nvPr>
             <p:extLst>
               <p:ext uri="{D42A27DB-BD31-4B8C-83A1-F6EECF244321}">
-                <p14:modId xmlns:p14="http://schemas.microsoft.com/office/powerpoint/2010/main" val="1247627005"/>
+                <p14:modId xmlns:p14="http://schemas.microsoft.com/office/powerpoint/2010/main" val="3991515434"/>
               </p:ext>
             </p:extLst>
           </p:nvPr>
@@ -25432,13 +25432,13 @@
   <p:clrMapOvr>
     <a:masterClrMapping/>
   </p:clrMapOvr>
-  <mc:AlternateContent xmlns:mc="http://schemas.openxmlformats.org/markup-compatibility/2006">
-    <mc:Choice xmlns:p14="http://schemas.microsoft.com/office/powerpoint/2010/main" Requires="p14">
+  <mc:AlternateContent xmlns:mc="http://schemas.openxmlformats.org/markup-compatibility/2006" xmlns:p14="http://schemas.microsoft.com/office/powerpoint/2010/main">
+    <mc:Choice Requires="p14">
       <p:transition p14:dur="250">
         <p:fade/>
       </p:transition>
     </mc:Choice>
-    <mc:Fallback>
+    <mc:Fallback xmlns="">
       <p:transition>
         <p:fade/>
       </p:transition>
@@ -26501,13 +26501,13 @@
   <p:clrMapOvr>
     <a:masterClrMapping/>
   </p:clrMapOvr>
-  <mc:AlternateContent xmlns:mc="http://schemas.openxmlformats.org/markup-compatibility/2006">
-    <mc:Choice xmlns:p14="http://schemas.microsoft.com/office/powerpoint/2010/main" Requires="p14">
+  <mc:AlternateContent xmlns:mc="http://schemas.openxmlformats.org/markup-compatibility/2006" xmlns:p14="http://schemas.microsoft.com/office/powerpoint/2010/main">
+    <mc:Choice Requires="p14">
       <p:transition p14:dur="250">
         <p:fade/>
       </p:transition>
     </mc:Choice>
-    <mc:Fallback>
+    <mc:Fallback xmlns="">
       <p:transition>
         <p:fade/>
       </p:transition>
@@ -27543,13 +27543,13 @@
   <p:clrMapOvr>
     <a:masterClrMapping/>
   </p:clrMapOvr>
-  <mc:AlternateContent xmlns:mc="http://schemas.openxmlformats.org/markup-compatibility/2006">
-    <mc:Choice xmlns:p14="http://schemas.microsoft.com/office/powerpoint/2010/main" Requires="p14">
+  <mc:AlternateContent xmlns:mc="http://schemas.openxmlformats.org/markup-compatibility/2006" xmlns:p14="http://schemas.microsoft.com/office/powerpoint/2010/main">
+    <mc:Choice Requires="p14">
       <p:transition p14:dur="250">
         <p:fade/>
       </p:transition>
     </mc:Choice>
-    <mc:Fallback>
+    <mc:Fallback xmlns="">
       <p:transition>
         <p:fade/>
       </p:transition>
@@ -28279,7 +28279,7 @@
                         <a:buAutoNum type="arabicPeriod"/>
                       </a:pPr>
                       <a:r>
-                        <a:rPr lang="en-US" sz="1800" b="0" i="0" u="none" strike="noStrike">
+                        <a:rPr lang="en-US" sz="1800" b="0" i="0" u="none" strike="noStrike" dirty="0">
                           <a:solidFill>
                             <a:schemeClr val="bg1"/>
                           </a:solidFill>
@@ -28301,7 +28301,7 @@
                         <a:buAutoNum type="arabicPeriod"/>
                       </a:pPr>
                       <a:r>
-                        <a:rPr lang="en-US" sz="1800" b="0" i="0" u="none" strike="noStrike">
+                        <a:rPr lang="en-US" sz="1800" b="0" i="0" u="none" strike="noStrike" dirty="0">
                           <a:solidFill>
                             <a:schemeClr val="bg1"/>
                           </a:solidFill>
@@ -28323,7 +28323,7 @@
                         <a:buAutoNum type="arabicPeriod"/>
                       </a:pPr>
                       <a:r>
-                        <a:rPr lang="en-US" sz="1800" b="0" i="0" u="none" strike="noStrike">
+                        <a:rPr lang="en-US" sz="1800" b="0" i="0" u="none" strike="noStrike" dirty="0">
                           <a:solidFill>
                             <a:schemeClr val="bg1"/>
                           </a:solidFill>
@@ -28345,7 +28345,7 @@
                         <a:buAutoNum type="arabicPeriod"/>
                       </a:pPr>
                       <a:r>
-                        <a:rPr lang="en-US" sz="1800" b="0" i="0" u="none" strike="noStrike">
+                        <a:rPr lang="en-US" sz="1800" b="0" i="0" u="none" strike="noStrike" dirty="0">
                           <a:solidFill>
                             <a:schemeClr val="bg1"/>
                           </a:solidFill>
@@ -28580,13 +28580,13 @@
   <p:clrMapOvr>
     <a:masterClrMapping/>
   </p:clrMapOvr>
-  <mc:AlternateContent xmlns:mc="http://schemas.openxmlformats.org/markup-compatibility/2006">
-    <mc:Choice xmlns:p14="http://schemas.microsoft.com/office/powerpoint/2010/main" Requires="p14">
+  <mc:AlternateContent xmlns:mc="http://schemas.openxmlformats.org/markup-compatibility/2006" xmlns:p14="http://schemas.microsoft.com/office/powerpoint/2010/main">
+    <mc:Choice Requires="p14">
       <p:transition p14:dur="250">
         <p:fade/>
       </p:transition>
     </mc:Choice>
-    <mc:Fallback>
+    <mc:Fallback xmlns="">
       <p:transition>
         <p:fade/>
       </p:transition>
@@ -29617,13 +29617,13 @@
   <p:clrMapOvr>
     <a:masterClrMapping/>
   </p:clrMapOvr>
-  <mc:AlternateContent xmlns:mc="http://schemas.openxmlformats.org/markup-compatibility/2006">
-    <mc:Choice xmlns:p14="http://schemas.microsoft.com/office/powerpoint/2010/main" Requires="p14">
+  <mc:AlternateContent xmlns:mc="http://schemas.openxmlformats.org/markup-compatibility/2006" xmlns:p14="http://schemas.microsoft.com/office/powerpoint/2010/main">
+    <mc:Choice Requires="p14">
       <p:transition p14:dur="250">
         <p:fade/>
       </p:transition>
     </mc:Choice>
-    <mc:Fallback>
+    <mc:Fallback xmlns="">
       <p:transition>
         <p:fade/>
       </p:transition>
@@ -29870,13 +29870,13 @@
   <p:clrMapOvr>
     <a:masterClrMapping/>
   </p:clrMapOvr>
-  <mc:AlternateContent xmlns:mc="http://schemas.openxmlformats.org/markup-compatibility/2006">
-    <mc:Choice xmlns:p14="http://schemas.microsoft.com/office/powerpoint/2010/main" Requires="p14">
+  <mc:AlternateContent xmlns:mc="http://schemas.openxmlformats.org/markup-compatibility/2006" xmlns:p14="http://schemas.microsoft.com/office/powerpoint/2010/main">
+    <mc:Choice Requires="p14">
       <p:transition p14:dur="250">
         <p:fade/>
       </p:transition>
     </mc:Choice>
-    <mc:Fallback>
+    <mc:Fallback xmlns="">
       <p:transition>
         <p:fade/>
       </p:transition>
@@ -30374,13 +30374,13 @@
   <p:clrMapOvr>
     <a:masterClrMapping/>
   </p:clrMapOvr>
-  <mc:AlternateContent xmlns:mc="http://schemas.openxmlformats.org/markup-compatibility/2006">
-    <mc:Choice xmlns:p14="http://schemas.microsoft.com/office/powerpoint/2010/main" Requires="p14">
+  <mc:AlternateContent xmlns:mc="http://schemas.openxmlformats.org/markup-compatibility/2006" xmlns:p14="http://schemas.microsoft.com/office/powerpoint/2010/main">
+    <mc:Choice Requires="p14">
       <p:transition p14:dur="250">
         <p:fade/>
       </p:transition>
     </mc:Choice>
-    <mc:Fallback>
+    <mc:Fallback xmlns="">
       <p:transition>
         <p:fade/>
       </p:transition>
@@ -30718,13 +30718,13 @@
   <p:clrMapOvr>
     <a:masterClrMapping/>
   </p:clrMapOvr>
-  <mc:AlternateContent xmlns:mc="http://schemas.openxmlformats.org/markup-compatibility/2006">
-    <mc:Choice xmlns:p14="http://schemas.microsoft.com/office/powerpoint/2010/main" Requires="p14">
+  <mc:AlternateContent xmlns:mc="http://schemas.openxmlformats.org/markup-compatibility/2006" xmlns:p14="http://schemas.microsoft.com/office/powerpoint/2010/main">
+    <mc:Choice Requires="p14">
       <p:transition p14:dur="250">
         <p:fade/>
       </p:transition>
     </mc:Choice>
-    <mc:Fallback>
+    <mc:Fallback xmlns="">
       <p:transition>
         <p:fade/>
       </p:transition>
@@ -31086,13 +31086,13 @@
   <p:clrMapOvr>
     <a:masterClrMapping/>
   </p:clrMapOvr>
-  <mc:AlternateContent xmlns:mc="http://schemas.openxmlformats.org/markup-compatibility/2006">
-    <mc:Choice xmlns:p14="http://schemas.microsoft.com/office/powerpoint/2010/main" Requires="p14">
+  <mc:AlternateContent xmlns:mc="http://schemas.openxmlformats.org/markup-compatibility/2006" xmlns:p14="http://schemas.microsoft.com/office/powerpoint/2010/main">
+    <mc:Choice Requires="p14">
       <p:transition p14:dur="250">
         <p:fade/>
       </p:transition>
     </mc:Choice>
-    <mc:Fallback>
+    <mc:Fallback xmlns="">
       <p:transition>
         <p:fade/>
       </p:transition>
@@ -32509,13 +32509,13 @@
   <p:clrMapOvr>
     <a:masterClrMapping/>
   </p:clrMapOvr>
-  <mc:AlternateContent xmlns:mc="http://schemas.openxmlformats.org/markup-compatibility/2006">
-    <mc:Choice xmlns:p14="http://schemas.microsoft.com/office/powerpoint/2010/main" Requires="p14">
+  <mc:AlternateContent xmlns:mc="http://schemas.openxmlformats.org/markup-compatibility/2006" xmlns:p14="http://schemas.microsoft.com/office/powerpoint/2010/main">
+    <mc:Choice Requires="p14">
       <p:transition p14:dur="250">
         <p:fade/>
       </p:transition>
     </mc:Choice>
-    <mc:Fallback>
+    <mc:Fallback xmlns="">
       <p:transition>
         <p:fade/>
       </p:transition>
@@ -35371,13 +35371,13 @@
   <p:clrMapOvr>
     <a:masterClrMapping/>
   </p:clrMapOvr>
-  <mc:AlternateContent xmlns:mc="http://schemas.openxmlformats.org/markup-compatibility/2006">
-    <mc:Choice xmlns:p14="http://schemas.microsoft.com/office/powerpoint/2010/main" Requires="p14">
+  <mc:AlternateContent xmlns:mc="http://schemas.openxmlformats.org/markup-compatibility/2006" xmlns:p14="http://schemas.microsoft.com/office/powerpoint/2010/main">
+    <mc:Choice Requires="p14">
       <p:transition p14:dur="250">
         <p:fade/>
       </p:transition>
     </mc:Choice>
-    <mc:Fallback>
+    <mc:Fallback xmlns="">
       <p:transition>
         <p:fade/>
       </p:transition>
@@ -35909,13 +35909,13 @@
   <p:clrMapOvr>
     <a:masterClrMapping/>
   </p:clrMapOvr>
-  <mc:AlternateContent xmlns:mc="http://schemas.openxmlformats.org/markup-compatibility/2006">
-    <mc:Choice xmlns:p14="http://schemas.microsoft.com/office/powerpoint/2010/main" Requires="p14">
+  <mc:AlternateContent xmlns:mc="http://schemas.openxmlformats.org/markup-compatibility/2006" xmlns:p14="http://schemas.microsoft.com/office/powerpoint/2010/main">
+    <mc:Choice Requires="p14">
       <p:transition p14:dur="250">
         <p:fade/>
       </p:transition>
     </mc:Choice>
-    <mc:Fallback>
+    <mc:Fallback xmlns="">
       <p:transition>
         <p:fade/>
       </p:transition>
@@ -36313,13 +36313,13 @@
   <p:clrMapOvr>
     <a:masterClrMapping/>
   </p:clrMapOvr>
-  <mc:AlternateContent xmlns:mc="http://schemas.openxmlformats.org/markup-compatibility/2006">
-    <mc:Choice xmlns:p14="http://schemas.microsoft.com/office/powerpoint/2010/main" Requires="p14">
+  <mc:AlternateContent xmlns:mc="http://schemas.openxmlformats.org/markup-compatibility/2006" xmlns:p14="http://schemas.microsoft.com/office/powerpoint/2010/main">
+    <mc:Choice Requires="p14">
       <p:transition p14:dur="250">
         <p:fade/>
       </p:transition>
     </mc:Choice>
-    <mc:Fallback>
+    <mc:Fallback xmlns="">
       <p:transition>
         <p:fade/>
       </p:transition>
@@ -36855,13 +36855,13 @@
   <p:clrMapOvr>
     <a:masterClrMapping/>
   </p:clrMapOvr>
-  <mc:AlternateContent xmlns:mc="http://schemas.openxmlformats.org/markup-compatibility/2006">
-    <mc:Choice xmlns:p14="http://schemas.microsoft.com/office/powerpoint/2010/main" Requires="p14">
+  <mc:AlternateContent xmlns:mc="http://schemas.openxmlformats.org/markup-compatibility/2006" xmlns:p14="http://schemas.microsoft.com/office/powerpoint/2010/main">
+    <mc:Choice Requires="p14">
       <p:transition p14:dur="250">
         <p:fade/>
       </p:transition>
     </mc:Choice>
-    <mc:Fallback>
+    <mc:Fallback xmlns="">
       <p:transition>
         <p:fade/>
       </p:transition>
@@ -38576,7 +38576,7 @@
             </p:grpSpPr>
             <p:pic>
               <p:nvPicPr>
-                <p:cNvPr id="35" name="Picture 35">
+                <p:cNvPr id="2" name="Picture 2">
                   <a:hlinkClick r:id="rId5" action="ppaction://hlinksldjump"/>
                 </p:cNvPr>
                 <p:cNvPicPr>
@@ -38607,7 +38607,7 @@
             </p:pic>
             <p:pic>
               <p:nvPicPr>
-                <p:cNvPr id="36" name="Picture 36">
+                <p:cNvPr id="3" name="Picture 3">
                   <a:hlinkClick r:id="rId6" action="ppaction://hlinksldjump"/>
                 </p:cNvPr>
                 <p:cNvPicPr>
@@ -38638,7 +38638,7 @@
             </p:pic>
             <p:pic>
               <p:nvPicPr>
-                <p:cNvPr id="37" name="Picture 37">
+                <p:cNvPr id="5" name="Picture 5">
                   <a:hlinkClick r:id="rId7" action="ppaction://hlinksldjump"/>
                 </p:cNvPr>
                 <p:cNvPicPr>
@@ -38669,7 +38669,7 @@
             </p:pic>
             <p:pic>
               <p:nvPicPr>
-                <p:cNvPr id="38" name="Picture 38">
+                <p:cNvPr id="8" name="Picture 8">
                   <a:hlinkClick r:id="rId8" action="ppaction://hlinksldjump"/>
                 </p:cNvPr>
                 <p:cNvPicPr>
@@ -38700,7 +38700,7 @@
             </p:pic>
             <p:pic>
               <p:nvPicPr>
-                <p:cNvPr id="39" name="Picture 39">
+                <p:cNvPr id="9" name="Picture 9">
                   <a:hlinkClick r:id="rId9" action="ppaction://hlinksldjump"/>
                 </p:cNvPr>
                 <p:cNvPicPr>
@@ -38731,7 +38731,7 @@
             </p:pic>
             <p:pic>
               <p:nvPicPr>
-                <p:cNvPr id="40" name="Picture 40">
+                <p:cNvPr id="11" name="Picture 11">
                   <a:hlinkClick r:id="rId10" action="ppaction://hlinksldjump"/>
                 </p:cNvPr>
                 <p:cNvPicPr>
@@ -38762,7 +38762,7 @@
             </p:pic>
             <p:pic>
               <p:nvPicPr>
-                <p:cNvPr id="41" name="Picture 41">
+                <p:cNvPr id="12" name="Picture 12">
                   <a:hlinkClick r:id="rId11" action="ppaction://hlinksldjump"/>
                 </p:cNvPr>
                 <p:cNvPicPr>
@@ -38793,7 +38793,7 @@
             </p:pic>
             <p:pic>
               <p:nvPicPr>
-                <p:cNvPr id="42" name="Picture 42">
+                <p:cNvPr id="13" name="Picture 13">
                   <a:hlinkClick r:id="rId58" action="ppaction://hlinksldjump"/>
                 </p:cNvPr>
                 <p:cNvPicPr>
@@ -38824,7 +38824,7 @@
             </p:pic>
             <p:pic>
               <p:nvPicPr>
-                <p:cNvPr id="43" name="Picture 43">
+                <p:cNvPr id="14" name="Picture 14">
                   <a:hlinkClick r:id="rId13" action="ppaction://hlinksldjump"/>
                 </p:cNvPr>
                 <p:cNvPicPr>
@@ -38855,7 +38855,7 @@
             </p:pic>
             <p:pic>
               <p:nvPicPr>
-                <p:cNvPr id="44" name="Picture 44">
+                <p:cNvPr id="15" name="Picture 15">
                   <a:hlinkClick r:id="rId14" action="ppaction://hlinksldjump"/>
                 </p:cNvPr>
                 <p:cNvPicPr>
@@ -38886,7 +38886,7 @@
             </p:pic>
             <p:pic>
               <p:nvPicPr>
-                <p:cNvPr id="45" name="Picture 45">
+                <p:cNvPr id="16" name="Picture 16">
                   <a:hlinkClick r:id="rId15" action="ppaction://hlinksldjump"/>
                 </p:cNvPr>
                 <p:cNvPicPr>
@@ -38917,7 +38917,7 @@
             </p:pic>
             <p:pic>
               <p:nvPicPr>
-                <p:cNvPr id="46" name="Picture 46">
+                <p:cNvPr id="17" name="Picture 17">
                   <a:hlinkClick r:id="rId59" action="ppaction://hlinksldjump"/>
                 </p:cNvPr>
                 <p:cNvPicPr>
@@ -38948,7 +38948,7 @@
             </p:pic>
             <p:pic>
               <p:nvPicPr>
-                <p:cNvPr id="47" name="Picture 47">
+                <p:cNvPr id="18" name="Picture 18">
                   <a:hlinkClick r:id="rId16" action="ppaction://hlinksldjump"/>
                 </p:cNvPr>
                 <p:cNvPicPr>
@@ -38979,7 +38979,7 @@
             </p:pic>
             <p:pic>
               <p:nvPicPr>
-                <p:cNvPr id="48" name="Picture 48">
+                <p:cNvPr id="19" name="Picture 19">
                   <a:hlinkClick r:id="rId17" action="ppaction://hlinksldjump"/>
                 </p:cNvPr>
                 <p:cNvPicPr>
@@ -39010,7 +39010,7 @@
             </p:pic>
             <p:pic>
               <p:nvPicPr>
-                <p:cNvPr id="49" name="Picture 49">
+                <p:cNvPr id="20" name="Picture 20">
                   <a:hlinkClick r:id="rId18" action="ppaction://hlinksldjump"/>
                 </p:cNvPr>
                 <p:cNvPicPr>
@@ -39041,7 +39041,7 @@
             </p:pic>
             <p:pic>
               <p:nvPicPr>
-                <p:cNvPr id="50" name="Picture 50">
+                <p:cNvPr id="21" name="Picture 21">
                   <a:hlinkClick r:id="rId19" action="ppaction://hlinksldjump"/>
                 </p:cNvPr>
                 <p:cNvPicPr>
@@ -39072,7 +39072,7 @@
             </p:pic>
             <p:pic>
               <p:nvPicPr>
-                <p:cNvPr id="51" name="Picture 51">
+                <p:cNvPr id="22" name="Picture 22">
                   <a:hlinkClick r:id="rId20" action="ppaction://hlinksldjump"/>
                 </p:cNvPr>
                 <p:cNvPicPr>
@@ -39103,7 +39103,7 @@
             </p:pic>
             <p:pic>
               <p:nvPicPr>
-                <p:cNvPr id="52" name="Picture 52">
+                <p:cNvPr id="23" name="Picture 23">
                   <a:hlinkClick r:id="rId21" action="ppaction://hlinksldjump"/>
                 </p:cNvPr>
                 <p:cNvPicPr>
@@ -39134,7 +39134,7 @@
             </p:pic>
             <p:pic>
               <p:nvPicPr>
-                <p:cNvPr id="53" name="Picture 53">
+                <p:cNvPr id="24" name="Picture 24">
                   <a:hlinkClick r:id="rId22" action="ppaction://hlinksldjump"/>
                 </p:cNvPr>
                 <p:cNvPicPr>
@@ -39165,7 +39165,7 @@
             </p:pic>
             <p:pic>
               <p:nvPicPr>
-                <p:cNvPr id="54" name="Picture 54">
+                <p:cNvPr id="25" name="Picture 25">
                   <a:hlinkClick r:id="rId23" action="ppaction://hlinksldjump"/>
                 </p:cNvPr>
                 <p:cNvPicPr>
@@ -39196,7 +39196,7 @@
             </p:pic>
             <p:pic>
               <p:nvPicPr>
-                <p:cNvPr id="55" name="Picture 55">
+                <p:cNvPr id="26" name="Picture 26">
                   <a:hlinkClick r:id="rId24" action="ppaction://hlinksldjump"/>
                 </p:cNvPr>
                 <p:cNvPicPr>
@@ -39227,7 +39227,7 @@
             </p:pic>
             <p:pic>
               <p:nvPicPr>
-                <p:cNvPr id="56" name="Picture 56">
+                <p:cNvPr id="27" name="Picture 27">
                   <a:hlinkClick r:id="rId25" action="ppaction://hlinksldjump"/>
                 </p:cNvPr>
                 <p:cNvPicPr>
@@ -39258,7 +39258,7 @@
             </p:pic>
             <p:pic>
               <p:nvPicPr>
-                <p:cNvPr id="57" name="Picture 57">
+                <p:cNvPr id="28" name="Picture 28">
                   <a:hlinkClick r:id="rId26" action="ppaction://hlinksldjump"/>
                 </p:cNvPr>
                 <p:cNvPicPr>
@@ -39289,7 +39289,7 @@
             </p:pic>
             <p:pic>
               <p:nvPicPr>
-                <p:cNvPr id="58" name="Picture 58">
+                <p:cNvPr id="29" name="Picture 29">
                   <a:hlinkClick r:id="rId27" action="ppaction://hlinksldjump"/>
                 </p:cNvPr>
                 <p:cNvPicPr>
@@ -39320,7 +39320,7 @@
             </p:pic>
             <p:pic>
               <p:nvPicPr>
-                <p:cNvPr id="59" name="Picture 59">
+                <p:cNvPr id="30" name="Picture 30">
                   <a:hlinkClick r:id="rId28" action="ppaction://hlinksldjump"/>
                 </p:cNvPr>
                 <p:cNvPicPr>
@@ -39351,7 +39351,7 @@
             </p:pic>
             <p:pic>
               <p:nvPicPr>
-                <p:cNvPr id="60" name="Picture 60">
+                <p:cNvPr id="31" name="Picture 31">
                   <a:hlinkClick r:id="rId29" action="ppaction://hlinksldjump"/>
                 </p:cNvPr>
                 <p:cNvPicPr>
@@ -39382,7 +39382,7 @@
             </p:pic>
             <p:pic>
               <p:nvPicPr>
-                <p:cNvPr id="61" name="Picture 61">
+                <p:cNvPr id="32" name="Picture 32">
                   <a:hlinkClick r:id="rId30" action="ppaction://hlinksldjump"/>
                 </p:cNvPr>
                 <p:cNvPicPr>
@@ -39424,13 +39424,13 @@
   <p:clrMapOvr>
     <a:masterClrMapping/>
   </p:clrMapOvr>
-  <mc:AlternateContent xmlns:mc="http://schemas.openxmlformats.org/markup-compatibility/2006">
-    <mc:Choice xmlns:p14="http://schemas.microsoft.com/office/powerpoint/2010/main" Requires="p14">
+  <mc:AlternateContent xmlns:mc="http://schemas.openxmlformats.org/markup-compatibility/2006" xmlns:p14="http://schemas.microsoft.com/office/powerpoint/2010/main">
+    <mc:Choice Requires="p14">
       <p:transition p14:dur="250">
         <p:fade/>
       </p:transition>
     </mc:Choice>
-    <mc:Fallback>
+    <mc:Fallback xmlns="">
       <p:transition>
         <p:fade/>
       </p:transition>
@@ -39756,13 +39756,13 @@
   <p:clrMapOvr>
     <a:masterClrMapping/>
   </p:clrMapOvr>
-  <mc:AlternateContent xmlns:mc="http://schemas.openxmlformats.org/markup-compatibility/2006">
-    <mc:Choice xmlns:p14="http://schemas.microsoft.com/office/powerpoint/2010/main" Requires="p14">
+  <mc:AlternateContent xmlns:mc="http://schemas.openxmlformats.org/markup-compatibility/2006" xmlns:p14="http://schemas.microsoft.com/office/powerpoint/2010/main">
+    <mc:Choice Requires="p14">
       <p:transition p14:dur="250">
         <p:fade/>
       </p:transition>
     </mc:Choice>
-    <mc:Fallback>
+    <mc:Fallback xmlns="">
       <p:transition>
         <p:fade/>
       </p:transition>
@@ -39999,13 +39999,13 @@
   <p:clrMapOvr>
     <a:masterClrMapping/>
   </p:clrMapOvr>
-  <mc:AlternateContent xmlns:mc="http://schemas.openxmlformats.org/markup-compatibility/2006">
-    <mc:Choice xmlns:p14="http://schemas.microsoft.com/office/powerpoint/2010/main" Requires="p14">
+  <mc:AlternateContent xmlns:mc="http://schemas.openxmlformats.org/markup-compatibility/2006" xmlns:p14="http://schemas.microsoft.com/office/powerpoint/2010/main">
+    <mc:Choice Requires="p14">
       <p:transition p14:dur="250">
         <p:fade/>
       </p:transition>
     </mc:Choice>
-    <mc:Fallback>
+    <mc:Fallback xmlns="">
       <p:transition>
         <p:fade/>
       </p:transition>
@@ -40502,13 +40502,13 @@
   <p:clrMapOvr>
     <a:masterClrMapping/>
   </p:clrMapOvr>
-  <mc:AlternateContent xmlns:mc="http://schemas.openxmlformats.org/markup-compatibility/2006">
-    <mc:Choice xmlns:p14="http://schemas.microsoft.com/office/powerpoint/2010/main" Requires="p14">
+  <mc:AlternateContent xmlns:mc="http://schemas.openxmlformats.org/markup-compatibility/2006" xmlns:p14="http://schemas.microsoft.com/office/powerpoint/2010/main">
+    <mc:Choice Requires="p14">
       <p:transition p14:dur="250">
         <p:fade/>
       </p:transition>
     </mc:Choice>
-    <mc:Fallback>
+    <mc:Fallback xmlns="">
       <p:transition>
         <p:fade/>
       </p:transition>
@@ -40995,13 +40995,13 @@
   <p:clrMapOvr>
     <a:masterClrMapping/>
   </p:clrMapOvr>
-  <mc:AlternateContent xmlns:mc="http://schemas.openxmlformats.org/markup-compatibility/2006">
-    <mc:Choice xmlns:p14="http://schemas.microsoft.com/office/powerpoint/2010/main" Requires="p14">
+  <mc:AlternateContent xmlns:mc="http://schemas.openxmlformats.org/markup-compatibility/2006" xmlns:p14="http://schemas.microsoft.com/office/powerpoint/2010/main">
+    <mc:Choice Requires="p14">
       <p:transition p14:dur="250">
         <p:fade/>
       </p:transition>
     </mc:Choice>
-    <mc:Fallback>
+    <mc:Fallback xmlns="">
       <p:transition>
         <p:fade/>
       </p:transition>
@@ -44867,13 +44867,13 @@
   <p:clrMapOvr>
     <a:masterClrMapping/>
   </p:clrMapOvr>
-  <mc:AlternateContent xmlns:mc="http://schemas.openxmlformats.org/markup-compatibility/2006">
-    <mc:Choice xmlns:p14="http://schemas.microsoft.com/office/powerpoint/2010/main" Requires="p14">
+  <mc:AlternateContent xmlns:mc="http://schemas.openxmlformats.org/markup-compatibility/2006" xmlns:p14="http://schemas.microsoft.com/office/powerpoint/2010/main">
+    <mc:Choice Requires="p14">
       <p:transition p14:dur="250">
         <p:fade/>
       </p:transition>
     </mc:Choice>
-    <mc:Fallback>
+    <mc:Fallback xmlns="">
       <p:transition>
         <p:fade/>
       </p:transition>
@@ -45423,13 +45423,13 @@
   <p:clrMapOvr>
     <a:masterClrMapping/>
   </p:clrMapOvr>
-  <mc:AlternateContent xmlns:mc="http://schemas.openxmlformats.org/markup-compatibility/2006">
-    <mc:Choice xmlns:p14="http://schemas.microsoft.com/office/powerpoint/2010/main" Requires="p14">
+  <mc:AlternateContent xmlns:mc="http://schemas.openxmlformats.org/markup-compatibility/2006" xmlns:p14="http://schemas.microsoft.com/office/powerpoint/2010/main">
+    <mc:Choice Requires="p14">
       <p:transition p14:dur="250">
         <p:fade/>
       </p:transition>
     </mc:Choice>
-    <mc:Fallback>
+    <mc:Fallback xmlns="">
       <p:transition>
         <p:fade/>
       </p:transition>

</xml_diff>